<commit_message>
add some more examples
</commit_message>
<xml_diff>
--- a/Java and You.pptx
+++ b/Java and You.pptx
@@ -10,27 +10,34 @@
     <p:sldId id="258" r:id="rId4"/>
     <p:sldId id="259" r:id="rId5"/>
     <p:sldId id="260" r:id="rId6"/>
-    <p:sldId id="261" r:id="rId7"/>
-    <p:sldId id="262" r:id="rId8"/>
-    <p:sldId id="263" r:id="rId9"/>
-    <p:sldId id="264" r:id="rId10"/>
-    <p:sldId id="265" r:id="rId11"/>
-    <p:sldId id="266" r:id="rId12"/>
-    <p:sldId id="268" r:id="rId13"/>
-    <p:sldId id="267" r:id="rId14"/>
-    <p:sldId id="277" r:id="rId15"/>
-    <p:sldId id="280" r:id="rId16"/>
-    <p:sldId id="271" r:id="rId17"/>
-    <p:sldId id="274" r:id="rId18"/>
-    <p:sldId id="282" r:id="rId19"/>
-    <p:sldId id="269" r:id="rId20"/>
-    <p:sldId id="275" r:id="rId21"/>
-    <p:sldId id="276" r:id="rId22"/>
-    <p:sldId id="278" r:id="rId23"/>
-    <p:sldId id="279" r:id="rId24"/>
-    <p:sldId id="283" r:id="rId25"/>
-    <p:sldId id="270" r:id="rId26"/>
-    <p:sldId id="281" r:id="rId27"/>
+    <p:sldId id="284" r:id="rId7"/>
+    <p:sldId id="287" r:id="rId8"/>
+    <p:sldId id="261" r:id="rId9"/>
+    <p:sldId id="262" r:id="rId10"/>
+    <p:sldId id="263" r:id="rId11"/>
+    <p:sldId id="264" r:id="rId12"/>
+    <p:sldId id="266" r:id="rId13"/>
+    <p:sldId id="288" r:id="rId14"/>
+    <p:sldId id="289" r:id="rId15"/>
+    <p:sldId id="268" r:id="rId16"/>
+    <p:sldId id="267" r:id="rId17"/>
+    <p:sldId id="277" r:id="rId18"/>
+    <p:sldId id="291" r:id="rId19"/>
+    <p:sldId id="280" r:id="rId20"/>
+    <p:sldId id="271" r:id="rId21"/>
+    <p:sldId id="274" r:id="rId22"/>
+    <p:sldId id="282" r:id="rId23"/>
+    <p:sldId id="269" r:id="rId24"/>
+    <p:sldId id="275" r:id="rId25"/>
+    <p:sldId id="276" r:id="rId26"/>
+    <p:sldId id="278" r:id="rId27"/>
+    <p:sldId id="279" r:id="rId28"/>
+    <p:sldId id="283" r:id="rId29"/>
+    <p:sldId id="285" r:id="rId30"/>
+    <p:sldId id="286" r:id="rId31"/>
+    <p:sldId id="290" r:id="rId32"/>
+    <p:sldId id="270" r:id="rId33"/>
+    <p:sldId id="281" r:id="rId34"/>
   </p:sldIdLst>
   <p:sldSz cx="12192000" cy="6858000"/>
   <p:notesSz cx="6858000" cy="9144000"/>
@@ -131,7 +138,7 @@
   </p:defaultTextStyle>
   <p:extLst>
     <p:ext uri="{EFAFB233-063F-42B5-8137-9DF3F51BA10A}">
-      <p15:sldGuideLst xmlns="" xmlns:p15="http://schemas.microsoft.com/office/powerpoint/2012/main">
+      <p15:sldGuideLst xmlns:p15="http://schemas.microsoft.com/office/powerpoint/2012/main" xmlns="">
         <p15:guide id="1" orient="horz" pos="2160">
           <p15:clr>
             <a:srgbClr val="A4A3A4"/>
@@ -279,7 +286,7 @@
           <a:p>
             <a:fld id="{F39DF565-07E7-4E18-A297-8BB9FAD79983}" type="datetimeFigureOut">
               <a:rPr lang="en-US" smtClean="0"/>
-              <a:t>2/18/14</a:t>
+              <a:t>2/19/14</a:t>
             </a:fld>
             <a:endParaRPr lang="en-US"/>
           </a:p>
@@ -449,7 +456,7 @@
           <a:p>
             <a:fld id="{F39DF565-07E7-4E18-A297-8BB9FAD79983}" type="datetimeFigureOut">
               <a:rPr lang="en-US" smtClean="0"/>
-              <a:t>2/18/14</a:t>
+              <a:t>2/19/14</a:t>
             </a:fld>
             <a:endParaRPr lang="en-US"/>
           </a:p>
@@ -629,7 +636,7 @@
           <a:p>
             <a:fld id="{F39DF565-07E7-4E18-A297-8BB9FAD79983}" type="datetimeFigureOut">
               <a:rPr lang="en-US" smtClean="0"/>
-              <a:t>2/18/14</a:t>
+              <a:t>2/19/14</a:t>
             </a:fld>
             <a:endParaRPr lang="en-US"/>
           </a:p>
@@ -799,7 +806,7 @@
           <a:p>
             <a:fld id="{F39DF565-07E7-4E18-A297-8BB9FAD79983}" type="datetimeFigureOut">
               <a:rPr lang="en-US" smtClean="0"/>
-              <a:t>2/18/14</a:t>
+              <a:t>2/19/14</a:t>
             </a:fld>
             <a:endParaRPr lang="en-US"/>
           </a:p>
@@ -1045,7 +1052,7 @@
           <a:p>
             <a:fld id="{F39DF565-07E7-4E18-A297-8BB9FAD79983}" type="datetimeFigureOut">
               <a:rPr lang="en-US" smtClean="0"/>
-              <a:t>2/18/14</a:t>
+              <a:t>2/19/14</a:t>
             </a:fld>
             <a:endParaRPr lang="en-US"/>
           </a:p>
@@ -1277,7 +1284,7 @@
           <a:p>
             <a:fld id="{F39DF565-07E7-4E18-A297-8BB9FAD79983}" type="datetimeFigureOut">
               <a:rPr lang="en-US" smtClean="0"/>
-              <a:t>2/18/14</a:t>
+              <a:t>2/19/14</a:t>
             </a:fld>
             <a:endParaRPr lang="en-US"/>
           </a:p>
@@ -1644,7 +1651,7 @@
           <a:p>
             <a:fld id="{F39DF565-07E7-4E18-A297-8BB9FAD79983}" type="datetimeFigureOut">
               <a:rPr lang="en-US" smtClean="0"/>
-              <a:t>2/18/14</a:t>
+              <a:t>2/19/14</a:t>
             </a:fld>
             <a:endParaRPr lang="en-US"/>
           </a:p>
@@ -1762,7 +1769,7 @@
           <a:p>
             <a:fld id="{F39DF565-07E7-4E18-A297-8BB9FAD79983}" type="datetimeFigureOut">
               <a:rPr lang="en-US" smtClean="0"/>
-              <a:t>2/18/14</a:t>
+              <a:t>2/19/14</a:t>
             </a:fld>
             <a:endParaRPr lang="en-US"/>
           </a:p>
@@ -1857,7 +1864,7 @@
           <a:p>
             <a:fld id="{F39DF565-07E7-4E18-A297-8BB9FAD79983}" type="datetimeFigureOut">
               <a:rPr lang="en-US" smtClean="0"/>
-              <a:t>2/18/14</a:t>
+              <a:t>2/19/14</a:t>
             </a:fld>
             <a:endParaRPr lang="en-US"/>
           </a:p>
@@ -2134,7 +2141,7 @@
           <a:p>
             <a:fld id="{F39DF565-07E7-4E18-A297-8BB9FAD79983}" type="datetimeFigureOut">
               <a:rPr lang="en-US" smtClean="0"/>
-              <a:t>2/18/14</a:t>
+              <a:t>2/19/14</a:t>
             </a:fld>
             <a:endParaRPr lang="en-US"/>
           </a:p>
@@ -2387,7 +2394,7 @@
           <a:p>
             <a:fld id="{F39DF565-07E7-4E18-A297-8BB9FAD79983}" type="datetimeFigureOut">
               <a:rPr lang="en-US" smtClean="0"/>
-              <a:t>2/18/14</a:t>
+              <a:t>2/19/14</a:t>
             </a:fld>
             <a:endParaRPr lang="en-US"/>
           </a:p>
@@ -2600,7 +2607,7 @@
           <a:p>
             <a:fld id="{F39DF565-07E7-4E18-A297-8BB9FAD79983}" type="datetimeFigureOut">
               <a:rPr lang="en-US" smtClean="0"/>
-              <a:t>2/18/14</a:t>
+              <a:t>2/19/14</a:t>
             </a:fld>
             <a:endParaRPr lang="en-US"/>
           </a:p>
@@ -3155,7 +3162,7 @@
           <a:p>
             <a:r>
               <a:rPr lang="en-US" dirty="0" smtClean="0"/>
-              <a:t>Scoping of variables is odd</a:t>
+              <a:t>Wait a second</a:t>
             </a:r>
             <a:endParaRPr lang="en-US" dirty="0"/>
           </a:p>
@@ -3173,104 +3180,42 @@
         </p:nvSpPr>
         <p:spPr/>
         <p:txBody>
-          <a:bodyPr>
-            <a:normAutofit fontScale="85000" lnSpcReduction="20000"/>
-          </a:bodyPr>
-          <a:lstStyle/>
-          <a:p>
-            <a:pPr marL="0" indent="0">
-              <a:buNone/>
-            </a:pPr>
+          <a:bodyPr/>
+          <a:lstStyle/>
+          <a:p>
+            <a:r>
+              <a:rPr lang="en-US" dirty="0" smtClean="0"/>
+              <a:t>We spend more time doing client side work than anything</a:t>
+            </a:r>
+          </a:p>
+          <a:p>
+            <a:r>
+              <a:rPr lang="en-US" dirty="0" smtClean="0"/>
+              <a:t>We can pound thru a backend super fast and on a schedule</a:t>
+            </a:r>
+          </a:p>
+          <a:p>
+            <a:r>
+              <a:rPr lang="en-US" dirty="0" smtClean="0"/>
+              <a:t>Client side programming still kicks our butts</a:t>
+            </a:r>
+          </a:p>
+          <a:p>
             <a:endParaRPr lang="en-US" dirty="0"/>
           </a:p>
           <a:p>
-            <a:pPr marL="0" indent="0">
-              <a:buNone/>
-            </a:pPr>
+            <a:r>
+              <a:rPr lang="en-US" dirty="0" smtClean="0"/>
+              <a:t>JavaScript is a major part of client side</a:t>
+            </a:r>
             <a:endParaRPr lang="en-US" dirty="0"/>
-          </a:p>
-          <a:p>
-            <a:pPr marL="0" indent="0">
-              <a:buNone/>
-            </a:pPr>
-            <a:r>
-              <a:rPr lang="en-US" dirty="0"/>
-              <a:t>function something() {</a:t>
-            </a:r>
-          </a:p>
-          <a:p>
-            <a:pPr marL="0" indent="0">
-              <a:buNone/>
-            </a:pPr>
-            <a:r>
-              <a:rPr lang="en-US" dirty="0"/>
-              <a:t>    poop = "bye";   </a:t>
-            </a:r>
-          </a:p>
-          <a:p>
-            <a:pPr marL="0" indent="0">
-              <a:buNone/>
-            </a:pPr>
-            <a:r>
-              <a:rPr lang="en-US" dirty="0"/>
-              <a:t>}</a:t>
-            </a:r>
-          </a:p>
-          <a:p>
-            <a:pPr marL="0" indent="0">
-              <a:buNone/>
-            </a:pPr>
-            <a:endParaRPr lang="en-US" dirty="0"/>
-          </a:p>
-          <a:p>
-            <a:pPr marL="0" indent="0">
-              <a:buNone/>
-            </a:pPr>
-            <a:r>
-              <a:rPr lang="en-US" dirty="0" err="1"/>
-              <a:t>var</a:t>
-            </a:r>
-            <a:r>
-              <a:rPr lang="en-US" dirty="0"/>
-              <a:t> poop = "hi";</a:t>
-            </a:r>
-          </a:p>
-          <a:p>
-            <a:pPr marL="0" indent="0">
-              <a:buNone/>
-            </a:pPr>
-            <a:endParaRPr lang="en-US" dirty="0"/>
-          </a:p>
-          <a:p>
-            <a:pPr marL="0" indent="0">
-              <a:buNone/>
-            </a:pPr>
-            <a:r>
-              <a:rPr lang="en-US" dirty="0"/>
-              <a:t>something();</a:t>
-            </a:r>
-          </a:p>
-          <a:p>
-            <a:pPr marL="0" indent="0">
-              <a:buNone/>
-            </a:pPr>
-            <a:endParaRPr lang="en-US" dirty="0"/>
-          </a:p>
-          <a:p>
-            <a:pPr marL="0" indent="0">
-              <a:buNone/>
-            </a:pPr>
-            <a:r>
-              <a:rPr lang="en-US" dirty="0"/>
-              <a:t>alert(poop); // "bye"</a:t>
-            </a:r>
           </a:p>
         </p:txBody>
       </p:sp>
     </p:spTree>
     <p:extLst>
       <p:ext uri="{BB962C8B-B14F-4D97-AF65-F5344CB8AC3E}">
-        <p14:creationId xmlns:p14="http://schemas.microsoft.com/office/powerpoint/2010/main" val="121548408"/>
+        <p14:creationId xmlns:p14="http://schemas.microsoft.com/office/powerpoint/2010/main" val="4264853513"/>
       </p:ext>
     </p:extLst>
   </p:cSld>
@@ -3314,7 +3259,7 @@
           <a:p>
             <a:r>
               <a:rPr lang="en-US" dirty="0" smtClean="0"/>
-              <a:t>JavaScript variables are function scoped</a:t>
+              <a:t>JavaScript is a little weird</a:t>
             </a:r>
             <a:endParaRPr lang="en-US" dirty="0"/>
           </a:p>
@@ -3335,86 +3280,18 @@
           <a:bodyPr/>
           <a:lstStyle/>
           <a:p>
-            <a:pPr marL="0" indent="0">
-              <a:buNone/>
-            </a:pPr>
-            <a:r>
-              <a:rPr lang="nb-NO" dirty="0"/>
-              <a:t> </a:t>
-            </a:r>
-            <a:r>
-              <a:rPr lang="nb-NO" dirty="0" smtClean="0"/>
-              <a:t>var </a:t>
-            </a:r>
-            <a:r>
-              <a:rPr lang="nb-NO" dirty="0"/>
-              <a:t>poop = "bye";   </a:t>
-            </a:r>
-          </a:p>
-          <a:p>
-            <a:pPr marL="0" indent="0">
-              <a:buNone/>
-            </a:pPr>
-            <a:r>
-              <a:rPr lang="nb-NO" dirty="0"/>
-              <a:t> </a:t>
-            </a:r>
-            <a:r>
-              <a:rPr lang="nb-NO" dirty="0" smtClean="0"/>
-              <a:t>if </a:t>
-            </a:r>
-            <a:r>
-              <a:rPr lang="nb-NO" dirty="0"/>
-              <a:t>(true) {</a:t>
-            </a:r>
-          </a:p>
-          <a:p>
-            <a:pPr marL="0" indent="0">
-              <a:buNone/>
-            </a:pPr>
-            <a:r>
-              <a:rPr lang="nb-NO" dirty="0"/>
-              <a:t>         var poop = "</a:t>
-            </a:r>
-            <a:r>
-              <a:rPr lang="nb-NO" dirty="0" err="1"/>
-              <a:t>hello</a:t>
-            </a:r>
-            <a:r>
-              <a:rPr lang="nb-NO" dirty="0"/>
-              <a:t>";   </a:t>
-            </a:r>
-          </a:p>
-          <a:p>
-            <a:pPr marL="0" indent="0">
-              <a:buNone/>
-            </a:pPr>
-            <a:r>
-              <a:rPr lang="nb-NO" dirty="0"/>
-              <a:t> </a:t>
-            </a:r>
-            <a:r>
-              <a:rPr lang="nb-NO" dirty="0" smtClean="0"/>
-              <a:t>}</a:t>
-            </a:r>
-            <a:endParaRPr lang="nb-NO" dirty="0"/>
-          </a:p>
-          <a:p>
-            <a:pPr marL="0" indent="0">
-              <a:buNone/>
-            </a:pPr>
-            <a:r>
-              <a:rPr lang="nb-NO" dirty="0"/>
-              <a:t> </a:t>
-            </a:r>
-            <a:r>
-              <a:rPr lang="nb-NO" dirty="0" smtClean="0"/>
-              <a:t>alert(poop</a:t>
-            </a:r>
-            <a:r>
-              <a:rPr lang="nb-NO" dirty="0"/>
-              <a:t>); </a:t>
-            </a:r>
+            <a:r>
+              <a:rPr lang="en-US" dirty="0" smtClean="0"/>
+              <a:t>Weird isn’t always bad</a:t>
+            </a:r>
+          </a:p>
+          <a:p>
+            <a:r>
+              <a:rPr lang="en-US" dirty="0" smtClean="0"/>
+              <a:t>First class functions in JavaScript are awesome</a:t>
+            </a:r>
+          </a:p>
+          <a:p>
             <a:endParaRPr lang="en-US" dirty="0"/>
           </a:p>
         </p:txBody>
@@ -3422,7 +3299,7 @@
     </p:spTree>
     <p:extLst>
       <p:ext uri="{BB962C8B-B14F-4D97-AF65-F5344CB8AC3E}">
-        <p14:creationId xmlns:p14="http://schemas.microsoft.com/office/powerpoint/2010/main" val="2416278553"/>
+        <p14:creationId xmlns:p14="http://schemas.microsoft.com/office/powerpoint/2010/main" val="2662107329"/>
       </p:ext>
     </p:extLst>
   </p:cSld>
@@ -3466,6 +3343,306 @@
           <a:p>
             <a:r>
               <a:rPr lang="en-US" dirty="0" smtClean="0"/>
+              <a:t>JavaScript variables are function scoped</a:t>
+            </a:r>
+            <a:endParaRPr lang="en-US" dirty="0"/>
+          </a:p>
+        </p:txBody>
+      </p:sp>
+      <p:sp>
+        <p:nvSpPr>
+          <p:cNvPr id="3" name="Content Placeholder 2"/>
+          <p:cNvSpPr>
+            <a:spLocks noGrp="1"/>
+          </p:cNvSpPr>
+          <p:nvPr>
+            <p:ph idx="1"/>
+          </p:nvPr>
+        </p:nvSpPr>
+        <p:spPr/>
+        <p:txBody>
+          <a:bodyPr/>
+          <a:lstStyle/>
+          <a:p>
+            <a:pPr marL="0" indent="0">
+              <a:buNone/>
+            </a:pPr>
+            <a:r>
+              <a:rPr lang="nb-NO" dirty="0"/>
+              <a:t> </a:t>
+            </a:r>
+            <a:r>
+              <a:rPr lang="nb-NO" dirty="0" smtClean="0"/>
+              <a:t>var </a:t>
+            </a:r>
+            <a:r>
+              <a:rPr lang="nb-NO" dirty="0"/>
+              <a:t>poop = "bye";   </a:t>
+            </a:r>
+          </a:p>
+          <a:p>
+            <a:pPr marL="0" indent="0">
+              <a:buNone/>
+            </a:pPr>
+            <a:r>
+              <a:rPr lang="nb-NO" dirty="0"/>
+              <a:t> </a:t>
+            </a:r>
+            <a:r>
+              <a:rPr lang="nb-NO" dirty="0" smtClean="0"/>
+              <a:t>if </a:t>
+            </a:r>
+            <a:r>
+              <a:rPr lang="nb-NO" dirty="0"/>
+              <a:t>(true) {</a:t>
+            </a:r>
+          </a:p>
+          <a:p>
+            <a:pPr marL="0" indent="0">
+              <a:buNone/>
+            </a:pPr>
+            <a:r>
+              <a:rPr lang="nb-NO" dirty="0"/>
+              <a:t>         var poop = "</a:t>
+            </a:r>
+            <a:r>
+              <a:rPr lang="nb-NO" dirty="0" err="1"/>
+              <a:t>hello</a:t>
+            </a:r>
+            <a:r>
+              <a:rPr lang="nb-NO" dirty="0"/>
+              <a:t>";   </a:t>
+            </a:r>
+          </a:p>
+          <a:p>
+            <a:pPr marL="0" indent="0">
+              <a:buNone/>
+            </a:pPr>
+            <a:r>
+              <a:rPr lang="nb-NO" dirty="0"/>
+              <a:t> </a:t>
+            </a:r>
+            <a:r>
+              <a:rPr lang="nb-NO" dirty="0" smtClean="0"/>
+              <a:t>}</a:t>
+            </a:r>
+            <a:endParaRPr lang="nb-NO" dirty="0"/>
+          </a:p>
+          <a:p>
+            <a:pPr marL="0" indent="0">
+              <a:buNone/>
+            </a:pPr>
+            <a:r>
+              <a:rPr lang="nb-NO" dirty="0"/>
+              <a:t> </a:t>
+            </a:r>
+            <a:r>
+              <a:rPr lang="nb-NO" dirty="0" smtClean="0"/>
+              <a:t>alert(poop</a:t>
+            </a:r>
+            <a:r>
+              <a:rPr lang="nb-NO" dirty="0"/>
+              <a:t>); </a:t>
+            </a:r>
+            <a:endParaRPr lang="en-US" dirty="0"/>
+          </a:p>
+        </p:txBody>
+      </p:sp>
+    </p:spTree>
+    <p:extLst>
+      <p:ext uri="{BB962C8B-B14F-4D97-AF65-F5344CB8AC3E}">
+        <p14:creationId xmlns:p14="http://schemas.microsoft.com/office/powerpoint/2010/main" val="2416278553"/>
+      </p:ext>
+    </p:extLst>
+  </p:cSld>
+  <p:clrMapOvr>
+    <a:masterClrMapping/>
+  </p:clrMapOvr>
+</p:sld>
+</file>
+
+<file path=ppt/slides/slide13.xml><?xml version="1.0" encoding="utf-8"?>
+<p:sld xmlns:a="http://schemas.openxmlformats.org/drawingml/2006/main" xmlns:r="http://schemas.openxmlformats.org/officeDocument/2006/relationships" xmlns:p="http://schemas.openxmlformats.org/presentationml/2006/main">
+  <p:cSld>
+    <p:spTree>
+      <p:nvGrpSpPr>
+        <p:cNvPr id="1" name=""/>
+        <p:cNvGrpSpPr/>
+        <p:nvPr/>
+      </p:nvGrpSpPr>
+      <p:grpSpPr>
+        <a:xfrm>
+          <a:off x="0" y="0"/>
+          <a:ext cx="0" cy="0"/>
+          <a:chOff x="0" y="0"/>
+          <a:chExt cx="0" cy="0"/>
+        </a:xfrm>
+      </p:grpSpPr>
+      <p:sp>
+        <p:nvSpPr>
+          <p:cNvPr id="2" name="Title 1"/>
+          <p:cNvSpPr>
+            <a:spLocks noGrp="1"/>
+          </p:cNvSpPr>
+          <p:nvPr>
+            <p:ph type="title"/>
+          </p:nvPr>
+        </p:nvSpPr>
+        <p:spPr/>
+        <p:txBody>
+          <a:bodyPr/>
+          <a:lstStyle/>
+          <a:p>
+            <a:r>
+              <a:rPr lang="en-US" dirty="0" smtClean="0"/>
+              <a:t>Odd comparison operators</a:t>
+            </a:r>
+            <a:endParaRPr lang="en-US" dirty="0"/>
+          </a:p>
+        </p:txBody>
+      </p:sp>
+      <p:sp>
+        <p:nvSpPr>
+          <p:cNvPr id="3" name="Content Placeholder 2"/>
+          <p:cNvSpPr>
+            <a:spLocks noGrp="1"/>
+          </p:cNvSpPr>
+          <p:nvPr>
+            <p:ph idx="1"/>
+          </p:nvPr>
+        </p:nvSpPr>
+        <p:spPr/>
+        <p:txBody>
+          <a:bodyPr/>
+          <a:lstStyle/>
+          <a:p>
+            <a:r>
+              <a:rPr lang="en-US" dirty="0" smtClean="0"/>
+              <a:t>== or ===</a:t>
+            </a:r>
+            <a:endParaRPr lang="en-US" dirty="0"/>
+          </a:p>
+        </p:txBody>
+      </p:sp>
+    </p:spTree>
+    <p:extLst>
+      <p:ext uri="{BB962C8B-B14F-4D97-AF65-F5344CB8AC3E}">
+        <p14:creationId xmlns:p14="http://schemas.microsoft.com/office/powerpoint/2010/main" val="4118174265"/>
+      </p:ext>
+    </p:extLst>
+  </p:cSld>
+  <p:clrMapOvr>
+    <a:masterClrMapping/>
+  </p:clrMapOvr>
+</p:sld>
+</file>
+
+<file path=ppt/slides/slide14.xml><?xml version="1.0" encoding="utf-8"?>
+<p:sld xmlns:a="http://schemas.openxmlformats.org/drawingml/2006/main" xmlns:r="http://schemas.openxmlformats.org/officeDocument/2006/relationships" xmlns:p="http://schemas.openxmlformats.org/presentationml/2006/main">
+  <p:cSld>
+    <p:spTree>
+      <p:nvGrpSpPr>
+        <p:cNvPr id="1" name=""/>
+        <p:cNvGrpSpPr/>
+        <p:nvPr/>
+      </p:nvGrpSpPr>
+      <p:grpSpPr>
+        <a:xfrm>
+          <a:off x="0" y="0"/>
+          <a:ext cx="0" cy="0"/>
+          <a:chOff x="0" y="0"/>
+          <a:chExt cx="0" cy="0"/>
+        </a:xfrm>
+      </p:grpSpPr>
+      <p:sp>
+        <p:nvSpPr>
+          <p:cNvPr id="2" name="Title 1"/>
+          <p:cNvSpPr>
+            <a:spLocks noGrp="1"/>
+          </p:cNvSpPr>
+          <p:nvPr>
+            <p:ph type="title"/>
+          </p:nvPr>
+        </p:nvSpPr>
+        <p:spPr/>
+        <p:txBody>
+          <a:bodyPr/>
+          <a:lstStyle/>
+          <a:p>
+            <a:r>
+              <a:rPr lang="en-US" dirty="0" smtClean="0"/>
+              <a:t>Be careful  when adding numbers and strings</a:t>
+            </a:r>
+            <a:endParaRPr lang="en-US" dirty="0"/>
+          </a:p>
+        </p:txBody>
+      </p:sp>
+      <p:sp>
+        <p:nvSpPr>
+          <p:cNvPr id="3" name="Content Placeholder 2"/>
+          <p:cNvSpPr>
+            <a:spLocks noGrp="1"/>
+          </p:cNvSpPr>
+          <p:nvPr>
+            <p:ph idx="1"/>
+          </p:nvPr>
+        </p:nvSpPr>
+        <p:spPr/>
+        <p:txBody>
+          <a:bodyPr/>
+          <a:lstStyle/>
+          <a:p>
+            <a:endParaRPr lang="en-US" dirty="0"/>
+          </a:p>
+        </p:txBody>
+      </p:sp>
+    </p:spTree>
+    <p:extLst>
+      <p:ext uri="{BB962C8B-B14F-4D97-AF65-F5344CB8AC3E}">
+        <p14:creationId xmlns:p14="http://schemas.microsoft.com/office/powerpoint/2010/main" val="3052663434"/>
+      </p:ext>
+    </p:extLst>
+  </p:cSld>
+  <p:clrMapOvr>
+    <a:masterClrMapping/>
+  </p:clrMapOvr>
+</p:sld>
+</file>
+
+<file path=ppt/slides/slide15.xml><?xml version="1.0" encoding="utf-8"?>
+<p:sld xmlns:a="http://schemas.openxmlformats.org/drawingml/2006/main" xmlns:r="http://schemas.openxmlformats.org/officeDocument/2006/relationships" xmlns:p="http://schemas.openxmlformats.org/presentationml/2006/main">
+  <p:cSld>
+    <p:spTree>
+      <p:nvGrpSpPr>
+        <p:cNvPr id="1" name=""/>
+        <p:cNvGrpSpPr/>
+        <p:nvPr/>
+      </p:nvGrpSpPr>
+      <p:grpSpPr>
+        <a:xfrm>
+          <a:off x="0" y="0"/>
+          <a:ext cx="0" cy="0"/>
+          <a:chOff x="0" y="0"/>
+          <a:chExt cx="0" cy="0"/>
+        </a:xfrm>
+      </p:grpSpPr>
+      <p:sp>
+        <p:nvSpPr>
+          <p:cNvPr id="2" name="Title 1"/>
+          <p:cNvSpPr>
+            <a:spLocks noGrp="1"/>
+          </p:cNvSpPr>
+          <p:nvPr>
+            <p:ph type="title"/>
+          </p:nvPr>
+        </p:nvSpPr>
+        <p:spPr/>
+        <p:txBody>
+          <a:bodyPr/>
+          <a:lstStyle/>
+          <a:p>
+            <a:r>
+              <a:rPr lang="en-US" dirty="0" smtClean="0"/>
               <a:t>Best Practices</a:t>
             </a:r>
             <a:endParaRPr lang="en-US" dirty="0"/>
@@ -3504,7 +3681,7 @@
 </p:sld>
 </file>
 
-<file path=ppt/slides/slide13.xml><?xml version="1.0" encoding="utf-8"?>
+<file path=ppt/slides/slide16.xml><?xml version="1.0" encoding="utf-8"?>
 <p:sld xmlns:a="http://schemas.openxmlformats.org/drawingml/2006/main" xmlns:r="http://schemas.openxmlformats.org/officeDocument/2006/relationships" xmlns:p="http://schemas.openxmlformats.org/presentationml/2006/main">
   <p:cSld>
     <p:spTree>
@@ -3627,296 +3804,6 @@
 </p:sld>
 </file>
 
-<file path=ppt/slides/slide14.xml><?xml version="1.0" encoding="utf-8"?>
-<p:sld xmlns:a="http://schemas.openxmlformats.org/drawingml/2006/main" xmlns:r="http://schemas.openxmlformats.org/officeDocument/2006/relationships" xmlns:p="http://schemas.openxmlformats.org/presentationml/2006/main">
-  <p:cSld>
-    <p:spTree>
-      <p:nvGrpSpPr>
-        <p:cNvPr id="1" name=""/>
-        <p:cNvGrpSpPr/>
-        <p:nvPr/>
-      </p:nvGrpSpPr>
-      <p:grpSpPr>
-        <a:xfrm>
-          <a:off x="0" y="0"/>
-          <a:ext cx="0" cy="0"/>
-          <a:chOff x="0" y="0"/>
-          <a:chExt cx="0" cy="0"/>
-        </a:xfrm>
-      </p:grpSpPr>
-      <p:sp>
-        <p:nvSpPr>
-          <p:cNvPr id="2" name="Title 1"/>
-          <p:cNvSpPr>
-            <a:spLocks noGrp="1"/>
-          </p:cNvSpPr>
-          <p:nvPr>
-            <p:ph type="title"/>
-          </p:nvPr>
-        </p:nvSpPr>
-        <p:spPr/>
-        <p:txBody>
-          <a:bodyPr/>
-          <a:lstStyle/>
-          <a:p>
-            <a:r>
-              <a:rPr lang="en-US" dirty="0" smtClean="0"/>
-              <a:t>Patterns</a:t>
-            </a:r>
-            <a:endParaRPr lang="en-US" dirty="0"/>
-          </a:p>
-        </p:txBody>
-      </p:sp>
-      <p:sp>
-        <p:nvSpPr>
-          <p:cNvPr id="3" name="Content Placeholder 2"/>
-          <p:cNvSpPr>
-            <a:spLocks noGrp="1"/>
-          </p:cNvSpPr>
-          <p:nvPr>
-            <p:ph idx="1"/>
-          </p:nvPr>
-        </p:nvSpPr>
-        <p:spPr/>
-        <p:txBody>
-          <a:bodyPr/>
-          <a:lstStyle/>
-          <a:p>
-            <a:r>
-              <a:rPr lang="en-US" dirty="0" smtClean="0"/>
-              <a:t>IIFE</a:t>
-            </a:r>
-          </a:p>
-          <a:p>
-            <a:r>
-              <a:rPr lang="en-US" dirty="0" smtClean="0"/>
-              <a:t>Semicolons</a:t>
-            </a:r>
-          </a:p>
-          <a:p>
-            <a:r>
-              <a:rPr lang="en-US" dirty="0" smtClean="0"/>
-              <a:t>Revealing Module</a:t>
-            </a:r>
-          </a:p>
-          <a:p>
-            <a:r>
-              <a:rPr lang="en-US" dirty="0" err="1" smtClean="0"/>
-              <a:t>TypeScript</a:t>
-            </a:r>
-            <a:r>
-              <a:rPr lang="en-US" dirty="0" smtClean="0"/>
-              <a:t> class</a:t>
-            </a:r>
-          </a:p>
-          <a:p>
-            <a:r>
-              <a:rPr lang="en-US" dirty="0" smtClean="0"/>
-              <a:t>Self/that</a:t>
-            </a:r>
-            <a:endParaRPr lang="en-US" dirty="0"/>
-          </a:p>
-        </p:txBody>
-      </p:sp>
-    </p:spTree>
-    <p:extLst>
-      <p:ext uri="{BB962C8B-B14F-4D97-AF65-F5344CB8AC3E}">
-        <p14:creationId xmlns:p14="http://schemas.microsoft.com/office/powerpoint/2010/main" val="3664596147"/>
-      </p:ext>
-    </p:extLst>
-  </p:cSld>
-  <p:clrMapOvr>
-    <a:masterClrMapping/>
-  </p:clrMapOvr>
-</p:sld>
-</file>
-
-<file path=ppt/slides/slide15.xml><?xml version="1.0" encoding="utf-8"?>
-<p:sld xmlns:a="http://schemas.openxmlformats.org/drawingml/2006/main" xmlns:r="http://schemas.openxmlformats.org/officeDocument/2006/relationships" xmlns:p="http://schemas.openxmlformats.org/presentationml/2006/main">
-  <p:cSld>
-    <p:spTree>
-      <p:nvGrpSpPr>
-        <p:cNvPr id="1" name=""/>
-        <p:cNvGrpSpPr/>
-        <p:nvPr/>
-      </p:nvGrpSpPr>
-      <p:grpSpPr>
-        <a:xfrm>
-          <a:off x="0" y="0"/>
-          <a:ext cx="0" cy="0"/>
-          <a:chOff x="0" y="0"/>
-          <a:chExt cx="0" cy="0"/>
-        </a:xfrm>
-      </p:grpSpPr>
-      <p:sp>
-        <p:nvSpPr>
-          <p:cNvPr id="2" name="Title 1"/>
-          <p:cNvSpPr>
-            <a:spLocks noGrp="1"/>
-          </p:cNvSpPr>
-          <p:nvPr>
-            <p:ph type="title"/>
-          </p:nvPr>
-        </p:nvSpPr>
-        <p:spPr/>
-        <p:txBody>
-          <a:bodyPr/>
-          <a:lstStyle/>
-          <a:p>
-            <a:r>
-              <a:rPr lang="en-US" dirty="0" err="1" smtClean="0"/>
-              <a:t>TypeScript</a:t>
-            </a:r>
-            <a:r>
-              <a:rPr lang="en-US" dirty="0" smtClean="0"/>
-              <a:t> or </a:t>
-            </a:r>
-            <a:r>
-              <a:rPr lang="en-US" dirty="0" err="1" smtClean="0"/>
-              <a:t>CoffeeScript</a:t>
-            </a:r>
-            <a:endParaRPr lang="en-US" dirty="0"/>
-          </a:p>
-        </p:txBody>
-      </p:sp>
-      <p:sp>
-        <p:nvSpPr>
-          <p:cNvPr id="3" name="Content Placeholder 2"/>
-          <p:cNvSpPr>
-            <a:spLocks noGrp="1"/>
-          </p:cNvSpPr>
-          <p:nvPr>
-            <p:ph idx="1"/>
-          </p:nvPr>
-        </p:nvSpPr>
-        <p:spPr/>
-        <p:txBody>
-          <a:bodyPr/>
-          <a:lstStyle/>
-          <a:p>
-            <a:r>
-              <a:rPr lang="en-US" dirty="0" smtClean="0"/>
-              <a:t>Assembly language of the web</a:t>
-            </a:r>
-          </a:p>
-          <a:p>
-            <a:r>
-              <a:rPr lang="en-US" dirty="0" smtClean="0"/>
-              <a:t>Both of these provide things such as classes and inheritance</a:t>
-            </a:r>
-          </a:p>
-          <a:p>
-            <a:r>
-              <a:rPr lang="en-US" dirty="0" smtClean="0"/>
-              <a:t>With newer browsers you can debug in native </a:t>
-            </a:r>
-            <a:r>
-              <a:rPr lang="en-US" dirty="0" err="1" smtClean="0"/>
-              <a:t>TypeScript</a:t>
-            </a:r>
-            <a:r>
-              <a:rPr lang="en-US" dirty="0" smtClean="0"/>
-              <a:t> or </a:t>
-            </a:r>
-            <a:r>
-              <a:rPr lang="en-US" dirty="0" err="1" smtClean="0"/>
-              <a:t>CoffeeScript</a:t>
-            </a:r>
-            <a:endParaRPr lang="en-US" dirty="0" smtClean="0"/>
-          </a:p>
-          <a:p>
-            <a:pPr marL="457200" lvl="1" indent="0">
-              <a:buNone/>
-            </a:pPr>
-            <a:endParaRPr lang="en-US" dirty="0"/>
-          </a:p>
-        </p:txBody>
-      </p:sp>
-    </p:spTree>
-    <p:extLst>
-      <p:ext uri="{BB962C8B-B14F-4D97-AF65-F5344CB8AC3E}">
-        <p14:creationId xmlns:p14="http://schemas.microsoft.com/office/powerpoint/2010/main" val="3029881239"/>
-      </p:ext>
-    </p:extLst>
-  </p:cSld>
-  <p:clrMapOvr>
-    <a:masterClrMapping/>
-  </p:clrMapOvr>
-</p:sld>
-</file>
-
-<file path=ppt/slides/slide16.xml><?xml version="1.0" encoding="utf-8"?>
-<p:sld xmlns:a="http://schemas.openxmlformats.org/drawingml/2006/main" xmlns:r="http://schemas.openxmlformats.org/officeDocument/2006/relationships" xmlns:p="http://schemas.openxmlformats.org/presentationml/2006/main">
-  <p:cSld>
-    <p:spTree>
-      <p:nvGrpSpPr>
-        <p:cNvPr id="1" name=""/>
-        <p:cNvGrpSpPr/>
-        <p:nvPr/>
-      </p:nvGrpSpPr>
-      <p:grpSpPr>
-        <a:xfrm>
-          <a:off x="0" y="0"/>
-          <a:ext cx="0" cy="0"/>
-          <a:chOff x="0" y="0"/>
-          <a:chExt cx="0" cy="0"/>
-        </a:xfrm>
-      </p:grpSpPr>
-      <p:sp>
-        <p:nvSpPr>
-          <p:cNvPr id="2" name="Title 1"/>
-          <p:cNvSpPr>
-            <a:spLocks noGrp="1"/>
-          </p:cNvSpPr>
-          <p:nvPr>
-            <p:ph type="title"/>
-          </p:nvPr>
-        </p:nvSpPr>
-        <p:spPr/>
-        <p:txBody>
-          <a:bodyPr/>
-          <a:lstStyle/>
-          <a:p>
-            <a:r>
-              <a:rPr lang="en-US" dirty="0" smtClean="0"/>
-              <a:t>TDD</a:t>
-            </a:r>
-            <a:endParaRPr lang="en-US" dirty="0"/>
-          </a:p>
-        </p:txBody>
-      </p:sp>
-      <p:sp>
-        <p:nvSpPr>
-          <p:cNvPr id="3" name="Text Placeholder 2"/>
-          <p:cNvSpPr>
-            <a:spLocks noGrp="1"/>
-          </p:cNvSpPr>
-          <p:nvPr>
-            <p:ph type="body" idx="1"/>
-          </p:nvPr>
-        </p:nvSpPr>
-        <p:spPr/>
-        <p:txBody>
-          <a:bodyPr/>
-          <a:lstStyle/>
-          <a:p>
-            <a:endParaRPr lang="en-US"/>
-          </a:p>
-        </p:txBody>
-      </p:sp>
-    </p:spTree>
-    <p:extLst>
-      <p:ext uri="{BB962C8B-B14F-4D97-AF65-F5344CB8AC3E}">
-        <p14:creationId xmlns:p14="http://schemas.microsoft.com/office/powerpoint/2010/main" val="93434976"/>
-      </p:ext>
-    </p:extLst>
-  </p:cSld>
-  <p:clrMapOvr>
-    <a:masterClrMapping/>
-  </p:clrMapOvr>
-</p:sld>
-</file>
-
 <file path=ppt/slides/slide17.xml><?xml version="1.0" encoding="utf-8"?>
 <p:sld xmlns:a="http://schemas.openxmlformats.org/drawingml/2006/main" xmlns:r="http://schemas.openxmlformats.org/officeDocument/2006/relationships" xmlns:p="http://schemas.openxmlformats.org/presentationml/2006/main">
   <p:cSld>
@@ -3936,7 +3823,7 @@
       </p:grpSpPr>
       <p:sp>
         <p:nvSpPr>
-          <p:cNvPr id="4" name="Title 3"/>
+          <p:cNvPr id="2" name="Title 1"/>
           <p:cNvSpPr>
             <a:spLocks noGrp="1"/>
           </p:cNvSpPr>
@@ -3951,7 +3838,7 @@
           <a:p>
             <a:r>
               <a:rPr lang="en-US" dirty="0" smtClean="0"/>
-              <a:t>Test, test, test</a:t>
+              <a:t>Patterns</a:t>
             </a:r>
             <a:endParaRPr lang="en-US" dirty="0"/>
           </a:p>
@@ -3959,7 +3846,7 @@
       </p:sp>
       <p:sp>
         <p:nvSpPr>
-          <p:cNvPr id="5" name="Content Placeholder 4"/>
+          <p:cNvPr id="3" name="Content Placeholder 2"/>
           <p:cNvSpPr>
             <a:spLocks noGrp="1"/>
           </p:cNvSpPr>
@@ -3974,22 +3861,36 @@
           <a:p>
             <a:r>
               <a:rPr lang="en-US" dirty="0" smtClean="0"/>
-              <a:t>Automated testing makes development faster</a:t>
-            </a:r>
-          </a:p>
-          <a:p>
-            <a:r>
-              <a:rPr lang="en-US" dirty="0" smtClean="0"/>
-              <a:t>Automated testing makes development more enjoyable</a:t>
-            </a:r>
-          </a:p>
-          <a:p>
-            <a:r>
-              <a:rPr lang="en-US" dirty="0" smtClean="0"/>
-              <a:t>Automated testing keeps you sane</a:t>
-            </a:r>
-          </a:p>
-          <a:p>
+              <a:t>IIFE</a:t>
+            </a:r>
+          </a:p>
+          <a:p>
+            <a:r>
+              <a:rPr lang="en-US" dirty="0" smtClean="0"/>
+              <a:t>Semicolons</a:t>
+            </a:r>
+          </a:p>
+          <a:p>
+            <a:r>
+              <a:rPr lang="en-US" dirty="0" smtClean="0"/>
+              <a:t>Revealing Module</a:t>
+            </a:r>
+          </a:p>
+          <a:p>
+            <a:r>
+              <a:rPr lang="en-US" dirty="0" err="1" smtClean="0"/>
+              <a:t>TypeScript</a:t>
+            </a:r>
+            <a:r>
+              <a:rPr lang="en-US" dirty="0" smtClean="0"/>
+              <a:t> class</a:t>
+            </a:r>
+          </a:p>
+          <a:p>
+            <a:r>
+              <a:rPr lang="en-US" dirty="0" smtClean="0"/>
+              <a:t>Self/that</a:t>
+            </a:r>
             <a:endParaRPr lang="en-US" dirty="0"/>
           </a:p>
         </p:txBody>
@@ -3997,7 +3898,7 @@
     </p:spTree>
     <p:extLst>
       <p:ext uri="{BB962C8B-B14F-4D97-AF65-F5344CB8AC3E}">
-        <p14:creationId xmlns:p14="http://schemas.microsoft.com/office/powerpoint/2010/main" val="1148604481"/>
+        <p14:creationId xmlns:p14="http://schemas.microsoft.com/office/powerpoint/2010/main" val="3664596147"/>
       </p:ext>
     </p:extLst>
   </p:cSld>
@@ -4041,7 +3942,7 @@
           <a:p>
             <a:r>
               <a:rPr lang="en-US" dirty="0" smtClean="0"/>
-              <a:t>Other frameworks</a:t>
+              <a:t>Use what a language does well</a:t>
             </a:r>
             <a:endParaRPr lang="en-US" dirty="0"/>
           </a:p>
@@ -4064,19 +3965,25 @@
           <a:p>
             <a:r>
               <a:rPr lang="en-US" dirty="0" smtClean="0"/>
-              <a:t>Jasmine </a:t>
-            </a:r>
-          </a:p>
-          <a:p>
-            <a:r>
-              <a:rPr lang="en-US" dirty="0" smtClean="0"/>
-              <a:t>Mocha</a:t>
-            </a:r>
-          </a:p>
-          <a:p>
-            <a:endParaRPr lang="en-US" dirty="0" smtClean="0"/>
-          </a:p>
-          <a:p>
+              <a:t>Minimize inheritance</a:t>
+            </a:r>
+          </a:p>
+          <a:p>
+            <a:r>
+              <a:rPr lang="en-US" dirty="0" smtClean="0"/>
+              <a:t>Go more functional</a:t>
+            </a:r>
+          </a:p>
+          <a:p>
+            <a:r>
+              <a:rPr lang="en-US" dirty="0" smtClean="0"/>
+              <a:t>Go dynamic</a:t>
+            </a:r>
+          </a:p>
+          <a:p>
+            <a:pPr marL="0" indent="0">
+              <a:buNone/>
+            </a:pPr>
             <a:endParaRPr lang="en-US" dirty="0"/>
           </a:p>
         </p:txBody>
@@ -4084,7 +3991,7 @@
     </p:spTree>
     <p:extLst>
       <p:ext uri="{BB962C8B-B14F-4D97-AF65-F5344CB8AC3E}">
-        <p14:creationId xmlns:p14="http://schemas.microsoft.com/office/powerpoint/2010/main" val="1157286007"/>
+        <p14:creationId xmlns:p14="http://schemas.microsoft.com/office/powerpoint/2010/main" val="2379514367"/>
       </p:ext>
     </p:extLst>
   </p:cSld>
@@ -4127,8 +4034,16 @@
           <a:lstStyle/>
           <a:p>
             <a:r>
-              <a:rPr lang="en-US" dirty="0" smtClean="0"/>
-              <a:t>Single Page Applications</a:t>
+              <a:rPr lang="en-US" dirty="0" err="1" smtClean="0"/>
+              <a:t>TypeScript</a:t>
+            </a:r>
+            <a:r>
+              <a:rPr lang="en-US" dirty="0" smtClean="0"/>
+              <a:t> or </a:t>
+            </a:r>
+            <a:r>
+              <a:rPr lang="en-US" dirty="0" err="1" smtClean="0"/>
+              <a:t>CoffeeScript</a:t>
             </a:r>
             <a:endParaRPr lang="en-US" dirty="0"/>
           </a:p>
@@ -4136,27 +4051,61 @@
       </p:sp>
       <p:sp>
         <p:nvSpPr>
-          <p:cNvPr id="3" name="Text Placeholder 2"/>
-          <p:cNvSpPr>
-            <a:spLocks noGrp="1"/>
-          </p:cNvSpPr>
-          <p:nvPr>
-            <p:ph type="body" idx="1"/>
-          </p:nvPr>
-        </p:nvSpPr>
-        <p:spPr/>
-        <p:txBody>
-          <a:bodyPr/>
-          <a:lstStyle/>
-          <a:p>
-            <a:endParaRPr lang="en-US"/>
+          <p:cNvPr id="3" name="Content Placeholder 2"/>
+          <p:cNvSpPr>
+            <a:spLocks noGrp="1"/>
+          </p:cNvSpPr>
+          <p:nvPr>
+            <p:ph idx="1"/>
+          </p:nvPr>
+        </p:nvSpPr>
+        <p:spPr/>
+        <p:txBody>
+          <a:bodyPr/>
+          <a:lstStyle/>
+          <a:p>
+            <a:r>
+              <a:rPr lang="en-US" dirty="0" smtClean="0"/>
+              <a:t>Assembly language of the web</a:t>
+            </a:r>
+          </a:p>
+          <a:p>
+            <a:r>
+              <a:rPr lang="en-US" dirty="0" smtClean="0"/>
+              <a:t>Both of these provide things such as classes and inheritance</a:t>
+            </a:r>
+          </a:p>
+          <a:p>
+            <a:r>
+              <a:rPr lang="en-US" dirty="0" smtClean="0"/>
+              <a:t>With newer browsers you can debug in native </a:t>
+            </a:r>
+            <a:r>
+              <a:rPr lang="en-US" dirty="0" err="1" smtClean="0"/>
+              <a:t>TypeScript</a:t>
+            </a:r>
+            <a:r>
+              <a:rPr lang="en-US" dirty="0" smtClean="0"/>
+              <a:t> or </a:t>
+            </a:r>
+            <a:r>
+              <a:rPr lang="en-US" dirty="0" err="1" smtClean="0"/>
+              <a:t>CoffeeScript</a:t>
+            </a:r>
+            <a:endParaRPr lang="en-US" dirty="0" smtClean="0"/>
+          </a:p>
+          <a:p>
+            <a:pPr marL="457200" lvl="1" indent="0">
+              <a:buNone/>
+            </a:pPr>
+            <a:endParaRPr lang="en-US" dirty="0"/>
           </a:p>
         </p:txBody>
       </p:sp>
     </p:spTree>
     <p:extLst>
       <p:ext uri="{BB962C8B-B14F-4D97-AF65-F5344CB8AC3E}">
-        <p14:creationId xmlns:p14="http://schemas.microsoft.com/office/powerpoint/2010/main" val="181626593"/>
+        <p14:creationId xmlns:p14="http://schemas.microsoft.com/office/powerpoint/2010/main" val="3029881239"/>
       </p:ext>
     </p:extLst>
   </p:cSld>
@@ -4346,7 +4295,7 @@
       </p:grpSpPr>
       <p:sp>
         <p:nvSpPr>
-          <p:cNvPr id="4" name="Title 3"/>
+          <p:cNvPr id="2" name="Title 1"/>
           <p:cNvSpPr>
             <a:spLocks noGrp="1"/>
           </p:cNvSpPr>
@@ -4361,7 +4310,7 @@
           <a:p>
             <a:r>
               <a:rPr lang="en-US" dirty="0" smtClean="0"/>
-              <a:t>SPA</a:t>
+              <a:t>TDD</a:t>
             </a:r>
             <a:endParaRPr lang="en-US" dirty="0"/>
           </a:p>
@@ -4369,49 +4318,27 @@
       </p:sp>
       <p:sp>
         <p:nvSpPr>
-          <p:cNvPr id="5" name="Content Placeholder 4"/>
-          <p:cNvSpPr>
-            <a:spLocks noGrp="1"/>
-          </p:cNvSpPr>
-          <p:nvPr>
-            <p:ph idx="1"/>
-          </p:nvPr>
-        </p:nvSpPr>
-        <p:spPr/>
-        <p:txBody>
-          <a:bodyPr/>
-          <a:lstStyle/>
-          <a:p>
-            <a:r>
-              <a:rPr lang="en-US" dirty="0" smtClean="0"/>
-              <a:t>Single page application</a:t>
-            </a:r>
-          </a:p>
-          <a:p>
-            <a:r>
-              <a:rPr lang="en-US" dirty="0" smtClean="0"/>
-              <a:t>Kind of a big deal right now</a:t>
-            </a:r>
-          </a:p>
-          <a:p>
-            <a:r>
-              <a:rPr lang="en-US" dirty="0" smtClean="0"/>
-              <a:t>Ask yourself do you really need a SPA</a:t>
-            </a:r>
-          </a:p>
-          <a:p>
-            <a:r>
-              <a:rPr lang="en-US" dirty="0" smtClean="0"/>
-              <a:t>Use frameworks to minimize the pain</a:t>
-            </a:r>
-            <a:endParaRPr lang="en-US" dirty="0"/>
+          <p:cNvPr id="3" name="Text Placeholder 2"/>
+          <p:cNvSpPr>
+            <a:spLocks noGrp="1"/>
+          </p:cNvSpPr>
+          <p:nvPr>
+            <p:ph type="body" idx="1"/>
+          </p:nvPr>
+        </p:nvSpPr>
+        <p:spPr/>
+        <p:txBody>
+          <a:bodyPr/>
+          <a:lstStyle/>
+          <a:p>
+            <a:endParaRPr lang="en-US"/>
           </a:p>
         </p:txBody>
       </p:sp>
     </p:spTree>
     <p:extLst>
       <p:ext uri="{BB962C8B-B14F-4D97-AF65-F5344CB8AC3E}">
-        <p14:creationId xmlns:p14="http://schemas.microsoft.com/office/powerpoint/2010/main" val="946356484"/>
+        <p14:creationId xmlns:p14="http://schemas.microsoft.com/office/powerpoint/2010/main" val="93434976"/>
       </p:ext>
     </p:extLst>
   </p:cSld>
@@ -4440,7 +4367,7 @@
       </p:grpSpPr>
       <p:sp>
         <p:nvSpPr>
-          <p:cNvPr id="2" name="Title 1"/>
+          <p:cNvPr id="4" name="Title 3"/>
           <p:cNvSpPr>
             <a:spLocks noGrp="1"/>
           </p:cNvSpPr>
@@ -4455,7 +4382,7 @@
           <a:p>
             <a:r>
               <a:rPr lang="en-US" dirty="0" smtClean="0"/>
-              <a:t>Angular</a:t>
+              <a:t>Test, test, test</a:t>
             </a:r>
             <a:endParaRPr lang="en-US" dirty="0"/>
           </a:p>
@@ -4463,7 +4390,7 @@
       </p:sp>
       <p:sp>
         <p:nvSpPr>
-          <p:cNvPr id="3" name="Content Placeholder 2"/>
+          <p:cNvPr id="5" name="Content Placeholder 4"/>
           <p:cNvSpPr>
             <a:spLocks noGrp="1"/>
           </p:cNvSpPr>
@@ -4478,63 +4405,30 @@
           <a:p>
             <a:r>
               <a:rPr lang="en-US" dirty="0" smtClean="0"/>
-              <a:t>Client side SPA framework</a:t>
-            </a:r>
-          </a:p>
-          <a:p>
-            <a:r>
-              <a:rPr lang="en-US" dirty="0" smtClean="0"/>
-              <a:t>Handles</a:t>
-            </a:r>
-          </a:p>
-          <a:p>
-            <a:pPr lvl="1"/>
-            <a:r>
-              <a:rPr lang="en-US" dirty="0" smtClean="0"/>
-              <a:t>Routing</a:t>
-            </a:r>
-          </a:p>
-          <a:p>
-            <a:pPr lvl="1"/>
-            <a:r>
-              <a:rPr lang="en-US" dirty="0" smtClean="0"/>
-              <a:t>Data binding</a:t>
-            </a:r>
-          </a:p>
-          <a:p>
-            <a:pPr lvl="1"/>
-            <a:r>
-              <a:rPr lang="en-US" dirty="0" smtClean="0"/>
-              <a:t>Testing</a:t>
-            </a:r>
-          </a:p>
-          <a:p>
-            <a:pPr lvl="1"/>
+              <a:t>Automated testing makes development faster</a:t>
+            </a:r>
+          </a:p>
+          <a:p>
+            <a:r>
+              <a:rPr lang="en-US" dirty="0" smtClean="0"/>
+              <a:t>Automated testing makes development more enjoyable</a:t>
+            </a:r>
+          </a:p>
+          <a:p>
+            <a:r>
+              <a:rPr lang="en-US" dirty="0" smtClean="0"/>
+              <a:t>Automated testing keeps you sane</a:t>
+            </a:r>
+          </a:p>
+          <a:p>
             <a:endParaRPr lang="en-US" dirty="0"/>
-          </a:p>
-          <a:p>
-            <a:r>
-              <a:rPr lang="en-US" dirty="0" smtClean="0"/>
-              <a:t>One framework for everything</a:t>
-            </a:r>
-          </a:p>
-          <a:p>
-            <a:pPr lvl="1"/>
-            <a:r>
-              <a:rPr lang="en-US" dirty="0" err="1" smtClean="0"/>
-              <a:t>Durandal</a:t>
-            </a:r>
-            <a:r>
-              <a:rPr lang="en-US" dirty="0" smtClean="0"/>
-              <a:t> – like Angular but built on other frameworks</a:t>
-            </a:r>
           </a:p>
         </p:txBody>
       </p:sp>
     </p:spTree>
     <p:extLst>
       <p:ext uri="{BB962C8B-B14F-4D97-AF65-F5344CB8AC3E}">
-        <p14:creationId xmlns:p14="http://schemas.microsoft.com/office/powerpoint/2010/main" val="1360579176"/>
+        <p14:creationId xmlns:p14="http://schemas.microsoft.com/office/powerpoint/2010/main" val="1148604481"/>
       </p:ext>
     </p:extLst>
   </p:cSld>
@@ -4578,7 +4472,7 @@
           <a:p>
             <a:r>
               <a:rPr lang="en-US" dirty="0" smtClean="0"/>
-              <a:t>Client side routing</a:t>
+              <a:t>Other frameworks</a:t>
             </a:r>
             <a:endParaRPr lang="en-US" dirty="0"/>
           </a:p>
@@ -4601,53 +4495,17 @@
           <a:p>
             <a:r>
               <a:rPr lang="en-US" dirty="0" smtClean="0"/>
-              <a:t>Client side routing often uses a #</a:t>
-            </a:r>
-          </a:p>
-          <a:p>
-            <a:endParaRPr lang="en-US" dirty="0"/>
-          </a:p>
-          <a:p>
-            <a:r>
-              <a:rPr lang="en-US" dirty="0" smtClean="0">
-                <a:hlinkClick r:id="rId2"/>
-              </a:rPr>
-              <a:t>http://myhost.com/hello/world</a:t>
-            </a:r>
-            <a:r>
-              <a:rPr lang="en-US" dirty="0" smtClean="0"/>
-              <a:t>  </a:t>
-            </a:r>
-          </a:p>
-          <a:p>
-            <a:r>
-              <a:rPr lang="en-US" dirty="0" smtClean="0"/>
-              <a:t>Client side is often</a:t>
-            </a:r>
-          </a:p>
-          <a:p>
-            <a:pPr lvl="1"/>
-            <a:r>
-              <a:rPr lang="en-US" dirty="0" smtClean="0">
-                <a:hlinkClick r:id="rId3"/>
-              </a:rPr>
-              <a:t>http://myhost.com/#hello/world</a:t>
-            </a:r>
+              <a:t>Jasmine </a:t>
+            </a:r>
+          </a:p>
+          <a:p>
+            <a:r>
+              <a:rPr lang="en-US" dirty="0" smtClean="0"/>
+              <a:t>Mocha</a:t>
+            </a:r>
+          </a:p>
+          <a:p>
             <a:endParaRPr lang="en-US" dirty="0" smtClean="0"/>
-          </a:p>
-          <a:p>
-            <a:r>
-              <a:rPr lang="en-US" dirty="0" smtClean="0"/>
-              <a:t>With html5 </a:t>
-            </a:r>
-            <a:r>
-              <a:rPr lang="en-US" dirty="0" err="1" smtClean="0"/>
-              <a:t>pushState</a:t>
-            </a:r>
-            <a:r>
-              <a:rPr lang="en-US" dirty="0" smtClean="0"/>
-              <a:t> you don’t have to have #</a:t>
-            </a:r>
           </a:p>
           <a:p>
             <a:endParaRPr lang="en-US" dirty="0"/>
@@ -4657,7 +4515,7 @@
     </p:spTree>
     <p:extLst>
       <p:ext uri="{BB962C8B-B14F-4D97-AF65-F5344CB8AC3E}">
-        <p14:creationId xmlns:p14="http://schemas.microsoft.com/office/powerpoint/2010/main" val="2880808482"/>
+        <p14:creationId xmlns:p14="http://schemas.microsoft.com/office/powerpoint/2010/main" val="1157286007"/>
       </p:ext>
     </p:extLst>
   </p:cSld>
@@ -4701,7 +4559,7 @@
           <a:p>
             <a:r>
               <a:rPr lang="en-US" dirty="0" smtClean="0"/>
-              <a:t>Data binding</a:t>
+              <a:t>Single Page Applications</a:t>
             </a:r>
             <a:endParaRPr lang="en-US" dirty="0"/>
           </a:p>
@@ -4709,88 +4567,27 @@
       </p:sp>
       <p:sp>
         <p:nvSpPr>
-          <p:cNvPr id="3" name="Content Placeholder 2"/>
-          <p:cNvSpPr>
-            <a:spLocks noGrp="1"/>
-          </p:cNvSpPr>
-          <p:nvPr>
-            <p:ph idx="1"/>
-          </p:nvPr>
-        </p:nvSpPr>
-        <p:spPr/>
-        <p:txBody>
-          <a:bodyPr/>
-          <a:lstStyle/>
-          <a:p>
-            <a:pPr marL="0" indent="0">
-              <a:buNone/>
-            </a:pPr>
-            <a:r>
-              <a:rPr lang="en-US" dirty="0" smtClean="0"/>
-              <a:t>&lt;div&gt;</a:t>
-            </a:r>
-          </a:p>
-          <a:p>
-            <a:pPr marL="0" indent="0">
-              <a:buNone/>
-            </a:pPr>
-            <a:r>
-              <a:rPr lang="en-US" dirty="0" smtClean="0"/>
-              <a:t>	&lt;div </a:t>
-            </a:r>
-            <a:r>
-              <a:rPr lang="en-US" dirty="0" err="1" smtClean="0"/>
-              <a:t>ng</a:t>
-            </a:r>
-            <a:r>
-              <a:rPr lang="en-US" dirty="0" smtClean="0"/>
-              <a:t>-repeat=“user in users”&gt;</a:t>
-            </a:r>
-          </a:p>
-          <a:p>
-            <a:pPr marL="0" indent="0">
-              <a:buNone/>
-            </a:pPr>
-            <a:r>
-              <a:rPr lang="en-US" dirty="0" smtClean="0"/>
-              <a:t>		{{</a:t>
-            </a:r>
-            <a:r>
-              <a:rPr lang="en-US" dirty="0" err="1" smtClean="0"/>
-              <a:t>user.name</a:t>
-            </a:r>
-            <a:r>
-              <a:rPr lang="en-US" dirty="0" smtClean="0"/>
-              <a:t>}}</a:t>
-            </a:r>
-            <a:endParaRPr lang="en-US" dirty="0"/>
-          </a:p>
-          <a:p>
-            <a:pPr marL="0" indent="0">
-              <a:buNone/>
-            </a:pPr>
-            <a:r>
-              <a:rPr lang="en-US" dirty="0" smtClean="0"/>
-              <a:t>	&lt;/div&gt;</a:t>
-            </a:r>
-            <a:endParaRPr lang="en-US" dirty="0"/>
-          </a:p>
-          <a:p>
-            <a:pPr marL="0" indent="0">
-              <a:buNone/>
-            </a:pPr>
-            <a:r>
-              <a:rPr lang="en-US" dirty="0" smtClean="0"/>
-              <a:t>&lt;/div&gt;</a:t>
-            </a:r>
-            <a:endParaRPr lang="en-US" dirty="0"/>
+          <p:cNvPr id="3" name="Text Placeholder 2"/>
+          <p:cNvSpPr>
+            <a:spLocks noGrp="1"/>
+          </p:cNvSpPr>
+          <p:nvPr>
+            <p:ph type="body" idx="1"/>
+          </p:nvPr>
+        </p:nvSpPr>
+        <p:spPr/>
+        <p:txBody>
+          <a:bodyPr/>
+          <a:lstStyle/>
+          <a:p>
+            <a:endParaRPr lang="en-US"/>
           </a:p>
         </p:txBody>
       </p:sp>
     </p:spTree>
     <p:extLst>
       <p:ext uri="{BB962C8B-B14F-4D97-AF65-F5344CB8AC3E}">
-        <p14:creationId xmlns:p14="http://schemas.microsoft.com/office/powerpoint/2010/main" val="2748125800"/>
+        <p14:creationId xmlns:p14="http://schemas.microsoft.com/office/powerpoint/2010/main" val="181626593"/>
       </p:ext>
     </p:extLst>
   </p:cSld>
@@ -4819,7 +4616,7 @@
       </p:grpSpPr>
       <p:sp>
         <p:nvSpPr>
-          <p:cNvPr id="2" name="Title 1"/>
+          <p:cNvPr id="4" name="Title 3"/>
           <p:cNvSpPr>
             <a:spLocks noGrp="1"/>
           </p:cNvSpPr>
@@ -4834,7 +4631,7 @@
           <a:p>
             <a:r>
               <a:rPr lang="en-US" dirty="0" smtClean="0"/>
-              <a:t>Routing</a:t>
+              <a:t>SPA</a:t>
             </a:r>
             <a:endParaRPr lang="en-US" dirty="0"/>
           </a:p>
@@ -4842,7 +4639,7 @@
       </p:sp>
       <p:sp>
         <p:nvSpPr>
-          <p:cNvPr id="3" name="Content Placeholder 2"/>
+          <p:cNvPr id="5" name="Content Placeholder 4"/>
           <p:cNvSpPr>
             <a:spLocks noGrp="1"/>
           </p:cNvSpPr>
@@ -4855,6 +4652,28 @@
           <a:bodyPr/>
           <a:lstStyle/>
           <a:p>
+            <a:r>
+              <a:rPr lang="en-US" dirty="0" smtClean="0"/>
+              <a:t>Single page application</a:t>
+            </a:r>
+          </a:p>
+          <a:p>
+            <a:r>
+              <a:rPr lang="en-US" dirty="0" smtClean="0"/>
+              <a:t>Kind of a big deal right now</a:t>
+            </a:r>
+          </a:p>
+          <a:p>
+            <a:r>
+              <a:rPr lang="en-US" dirty="0" smtClean="0"/>
+              <a:t>Ask yourself do you really need a SPA</a:t>
+            </a:r>
+          </a:p>
+          <a:p>
+            <a:r>
+              <a:rPr lang="en-US" dirty="0" smtClean="0"/>
+              <a:t>Use frameworks to minimize the pain</a:t>
+            </a:r>
             <a:endParaRPr lang="en-US" dirty="0"/>
           </a:p>
         </p:txBody>
@@ -4862,7 +4681,7 @@
     </p:spTree>
     <p:extLst>
       <p:ext uri="{BB962C8B-B14F-4D97-AF65-F5344CB8AC3E}">
-        <p14:creationId xmlns:p14="http://schemas.microsoft.com/office/powerpoint/2010/main" val="3529999232"/>
+        <p14:creationId xmlns:p14="http://schemas.microsoft.com/office/powerpoint/2010/main" val="946356484"/>
       </p:ext>
     </p:extLst>
   </p:cSld>
@@ -4905,8 +4724,8 @@
           <a:lstStyle/>
           <a:p>
             <a:r>
-              <a:rPr lang="en-US" smtClean="0"/>
-              <a:t>Node</a:t>
+              <a:rPr lang="en-US" dirty="0" smtClean="0"/>
+              <a:t>Angular</a:t>
             </a:r>
             <a:endParaRPr lang="en-US" dirty="0"/>
           </a:p>
@@ -4914,27 +4733,78 @@
       </p:sp>
       <p:sp>
         <p:nvSpPr>
-          <p:cNvPr id="3" name="Text Placeholder 2"/>
-          <p:cNvSpPr>
-            <a:spLocks noGrp="1"/>
-          </p:cNvSpPr>
-          <p:nvPr>
-            <p:ph type="body" idx="1"/>
-          </p:nvPr>
-        </p:nvSpPr>
-        <p:spPr/>
-        <p:txBody>
-          <a:bodyPr/>
-          <a:lstStyle/>
-          <a:p>
-            <a:endParaRPr lang="en-US"/>
+          <p:cNvPr id="3" name="Content Placeholder 2"/>
+          <p:cNvSpPr>
+            <a:spLocks noGrp="1"/>
+          </p:cNvSpPr>
+          <p:nvPr>
+            <p:ph idx="1"/>
+          </p:nvPr>
+        </p:nvSpPr>
+        <p:spPr/>
+        <p:txBody>
+          <a:bodyPr/>
+          <a:lstStyle/>
+          <a:p>
+            <a:r>
+              <a:rPr lang="en-US" dirty="0" smtClean="0"/>
+              <a:t>Client side SPA framework</a:t>
+            </a:r>
+          </a:p>
+          <a:p>
+            <a:r>
+              <a:rPr lang="en-US" dirty="0" smtClean="0"/>
+              <a:t>Handles</a:t>
+            </a:r>
+          </a:p>
+          <a:p>
+            <a:pPr lvl="1"/>
+            <a:r>
+              <a:rPr lang="en-US" dirty="0" smtClean="0"/>
+              <a:t>Routing</a:t>
+            </a:r>
+          </a:p>
+          <a:p>
+            <a:pPr lvl="1"/>
+            <a:r>
+              <a:rPr lang="en-US" dirty="0" smtClean="0"/>
+              <a:t>Data binding</a:t>
+            </a:r>
+          </a:p>
+          <a:p>
+            <a:pPr lvl="1"/>
+            <a:r>
+              <a:rPr lang="en-US" dirty="0" smtClean="0"/>
+              <a:t>Testing</a:t>
+            </a:r>
+          </a:p>
+          <a:p>
+            <a:pPr lvl="1"/>
+            <a:endParaRPr lang="en-US" dirty="0"/>
+          </a:p>
+          <a:p>
+            <a:r>
+              <a:rPr lang="en-US" dirty="0" smtClean="0"/>
+              <a:t>One framework for everything</a:t>
+            </a:r>
+          </a:p>
+          <a:p>
+            <a:pPr lvl="1"/>
+            <a:r>
+              <a:rPr lang="en-US" dirty="0" err="1" smtClean="0"/>
+              <a:t>Durandal</a:t>
+            </a:r>
+            <a:r>
+              <a:rPr lang="en-US" dirty="0" smtClean="0"/>
+              <a:t> – like Angular but built on other frameworks</a:t>
+            </a:r>
           </a:p>
         </p:txBody>
       </p:sp>
     </p:spTree>
     <p:extLst>
       <p:ext uri="{BB962C8B-B14F-4D97-AF65-F5344CB8AC3E}">
-        <p14:creationId xmlns:p14="http://schemas.microsoft.com/office/powerpoint/2010/main" val="1312284567"/>
+        <p14:creationId xmlns:p14="http://schemas.microsoft.com/office/powerpoint/2010/main" val="1360579176"/>
       </p:ext>
     </p:extLst>
   </p:cSld>
@@ -4963,7 +4833,7 @@
       </p:grpSpPr>
       <p:sp>
         <p:nvSpPr>
-          <p:cNvPr id="4" name="Title 3"/>
+          <p:cNvPr id="2" name="Title 1"/>
           <p:cNvSpPr>
             <a:spLocks noGrp="1"/>
           </p:cNvSpPr>
@@ -4978,7 +4848,7 @@
           <a:p>
             <a:r>
               <a:rPr lang="en-US" dirty="0" smtClean="0"/>
-              <a:t>JavaScript on the Server</a:t>
+              <a:t>Client side routing</a:t>
             </a:r>
             <a:endParaRPr lang="en-US" dirty="0"/>
           </a:p>
@@ -4986,7 +4856,7 @@
       </p:sp>
       <p:sp>
         <p:nvSpPr>
-          <p:cNvPr id="5" name="Content Placeholder 4"/>
+          <p:cNvPr id="3" name="Content Placeholder 2"/>
           <p:cNvSpPr>
             <a:spLocks noGrp="1"/>
           </p:cNvSpPr>
@@ -5000,42 +4870,56 @@
           <a:lstStyle/>
           <a:p>
             <a:r>
+              <a:rPr lang="en-US" dirty="0" smtClean="0"/>
+              <a:t>Client side routing often uses a #</a:t>
+            </a:r>
+          </a:p>
+          <a:p>
+            <a:endParaRPr lang="en-US" dirty="0"/>
+          </a:p>
+          <a:p>
+            <a:r>
+              <a:rPr lang="en-US" dirty="0" smtClean="0">
+                <a:hlinkClick r:id="rId2"/>
+              </a:rPr>
+              <a:t>http://myhost.com/hello/world</a:t>
+            </a:r>
+            <a:r>
+              <a:rPr lang="en-US" dirty="0" smtClean="0"/>
+              <a:t>  </a:t>
+            </a:r>
+          </a:p>
+          <a:p>
+            <a:r>
+              <a:rPr lang="en-US" dirty="0" smtClean="0"/>
+              <a:t>Client side is often</a:t>
+            </a:r>
+          </a:p>
+          <a:p>
+            <a:pPr lvl="1"/>
+            <a:r>
+              <a:rPr lang="en-US" dirty="0" smtClean="0">
+                <a:hlinkClick r:id="rId3"/>
+              </a:rPr>
+              <a:t>http://myhost.com/#hello/world</a:t>
+            </a:r>
+            <a:endParaRPr lang="en-US" dirty="0" smtClean="0"/>
+          </a:p>
+          <a:p>
+            <a:r>
+              <a:rPr lang="en-US" dirty="0" smtClean="0"/>
+              <a:t>With html5 </a:t>
+            </a:r>
+            <a:r>
               <a:rPr lang="en-US" dirty="0" err="1" smtClean="0"/>
-              <a:t>sockets.io</a:t>
-            </a:r>
-            <a:endParaRPr lang="en-US" dirty="0" smtClean="0"/>
-          </a:p>
-          <a:p>
-            <a:pPr lvl="1"/>
-            <a:r>
-              <a:rPr lang="en-US" dirty="0" smtClean="0"/>
-              <a:t>Push notifications from the server</a:t>
-            </a:r>
-          </a:p>
-          <a:p>
-            <a:pPr lvl="1"/>
-            <a:endParaRPr lang="en-US" dirty="0"/>
-          </a:p>
-          <a:p>
-            <a:r>
-              <a:rPr lang="en-US" dirty="0" smtClean="0"/>
-              <a:t>Low footprint</a:t>
-            </a:r>
-          </a:p>
-          <a:p>
-            <a:r>
-              <a:rPr lang="en-US" dirty="0" smtClean="0"/>
-              <a:t>Fast</a:t>
-            </a:r>
-          </a:p>
-          <a:p>
-            <a:endParaRPr lang="en-US" dirty="0"/>
-          </a:p>
-          <a:p>
-            <a:r>
-              <a:rPr lang="en-US" dirty="0" smtClean="0"/>
-              <a:t>Very early</a:t>
-            </a:r>
+              <a:t>pushState</a:t>
+            </a:r>
+            <a:r>
+              <a:rPr lang="en-US" dirty="0" smtClean="0"/>
+              <a:t> you don’t have to have #</a:t>
+            </a:r>
+          </a:p>
+          <a:p>
             <a:endParaRPr lang="en-US" dirty="0"/>
           </a:p>
         </p:txBody>
@@ -5043,7 +4927,599 @@
     </p:spTree>
     <p:extLst>
       <p:ext uri="{BB962C8B-B14F-4D97-AF65-F5344CB8AC3E}">
-        <p14:creationId xmlns:p14="http://schemas.microsoft.com/office/powerpoint/2010/main" val="139108835"/>
+        <p14:creationId xmlns:p14="http://schemas.microsoft.com/office/powerpoint/2010/main" val="2880808482"/>
+      </p:ext>
+    </p:extLst>
+  </p:cSld>
+  <p:clrMapOvr>
+    <a:masterClrMapping/>
+  </p:clrMapOvr>
+</p:sld>
+</file>
+
+<file path=ppt/slides/slide27.xml><?xml version="1.0" encoding="utf-8"?>
+<p:sld xmlns:a="http://schemas.openxmlformats.org/drawingml/2006/main" xmlns:r="http://schemas.openxmlformats.org/officeDocument/2006/relationships" xmlns:p="http://schemas.openxmlformats.org/presentationml/2006/main">
+  <p:cSld>
+    <p:spTree>
+      <p:nvGrpSpPr>
+        <p:cNvPr id="1" name=""/>
+        <p:cNvGrpSpPr/>
+        <p:nvPr/>
+      </p:nvGrpSpPr>
+      <p:grpSpPr>
+        <a:xfrm>
+          <a:off x="0" y="0"/>
+          <a:ext cx="0" cy="0"/>
+          <a:chOff x="0" y="0"/>
+          <a:chExt cx="0" cy="0"/>
+        </a:xfrm>
+      </p:grpSpPr>
+      <p:sp>
+        <p:nvSpPr>
+          <p:cNvPr id="2" name="Title 1"/>
+          <p:cNvSpPr>
+            <a:spLocks noGrp="1"/>
+          </p:cNvSpPr>
+          <p:nvPr>
+            <p:ph type="title"/>
+          </p:nvPr>
+        </p:nvSpPr>
+        <p:spPr/>
+        <p:txBody>
+          <a:bodyPr/>
+          <a:lstStyle/>
+          <a:p>
+            <a:r>
+              <a:rPr lang="en-US" dirty="0" smtClean="0"/>
+              <a:t>Data binding</a:t>
+            </a:r>
+            <a:endParaRPr lang="en-US" dirty="0"/>
+          </a:p>
+        </p:txBody>
+      </p:sp>
+      <p:sp>
+        <p:nvSpPr>
+          <p:cNvPr id="3" name="Content Placeholder 2"/>
+          <p:cNvSpPr>
+            <a:spLocks noGrp="1"/>
+          </p:cNvSpPr>
+          <p:nvPr>
+            <p:ph idx="1"/>
+          </p:nvPr>
+        </p:nvSpPr>
+        <p:spPr/>
+        <p:txBody>
+          <a:bodyPr/>
+          <a:lstStyle/>
+          <a:p>
+            <a:pPr marL="0" indent="0">
+              <a:buNone/>
+            </a:pPr>
+            <a:r>
+              <a:rPr lang="en-US" dirty="0" smtClean="0">
+                <a:latin typeface="Consolas" panose="020B0609020204030204" pitchFamily="49" charset="0"/>
+                <a:cs typeface="Consolas" panose="020B0609020204030204" pitchFamily="49" charset="0"/>
+              </a:rPr>
+              <a:t>&lt;div&gt;</a:t>
+            </a:r>
+          </a:p>
+          <a:p>
+            <a:pPr marL="0" indent="0">
+              <a:buNone/>
+            </a:pPr>
+            <a:r>
+              <a:rPr lang="en-US" dirty="0" smtClean="0">
+                <a:latin typeface="Consolas" panose="020B0609020204030204" pitchFamily="49" charset="0"/>
+                <a:cs typeface="Consolas" panose="020B0609020204030204" pitchFamily="49" charset="0"/>
+              </a:rPr>
+              <a:t>	&lt;div ng-repeat=“user in users”&gt;</a:t>
+            </a:r>
+          </a:p>
+          <a:p>
+            <a:pPr marL="0" indent="0">
+              <a:buNone/>
+            </a:pPr>
+            <a:r>
+              <a:rPr lang="en-US" dirty="0" smtClean="0">
+                <a:latin typeface="Consolas" panose="020B0609020204030204" pitchFamily="49" charset="0"/>
+                <a:cs typeface="Consolas" panose="020B0609020204030204" pitchFamily="49" charset="0"/>
+              </a:rPr>
+              <a:t>		{{</a:t>
+            </a:r>
+            <a:r>
+              <a:rPr lang="en-US" dirty="0" err="1" smtClean="0">
+                <a:latin typeface="Consolas" panose="020B0609020204030204" pitchFamily="49" charset="0"/>
+                <a:cs typeface="Consolas" panose="020B0609020204030204" pitchFamily="49" charset="0"/>
+              </a:rPr>
+              <a:t>user.name</a:t>
+            </a:r>
+            <a:r>
+              <a:rPr lang="en-US" dirty="0" smtClean="0">
+                <a:latin typeface="Consolas" panose="020B0609020204030204" pitchFamily="49" charset="0"/>
+                <a:cs typeface="Consolas" panose="020B0609020204030204" pitchFamily="49" charset="0"/>
+              </a:rPr>
+              <a:t>}}</a:t>
+            </a:r>
+            <a:endParaRPr lang="en-US" dirty="0">
+              <a:latin typeface="Consolas" panose="020B0609020204030204" pitchFamily="49" charset="0"/>
+              <a:cs typeface="Consolas" panose="020B0609020204030204" pitchFamily="49" charset="0"/>
+            </a:endParaRPr>
+          </a:p>
+          <a:p>
+            <a:pPr marL="0" indent="0">
+              <a:buNone/>
+            </a:pPr>
+            <a:r>
+              <a:rPr lang="en-US" dirty="0" smtClean="0">
+                <a:latin typeface="Consolas" panose="020B0609020204030204" pitchFamily="49" charset="0"/>
+                <a:cs typeface="Consolas" panose="020B0609020204030204" pitchFamily="49" charset="0"/>
+              </a:rPr>
+              <a:t>	&lt;/div&gt;</a:t>
+            </a:r>
+            <a:endParaRPr lang="en-US" dirty="0">
+              <a:latin typeface="Consolas" panose="020B0609020204030204" pitchFamily="49" charset="0"/>
+              <a:cs typeface="Consolas" panose="020B0609020204030204" pitchFamily="49" charset="0"/>
+            </a:endParaRPr>
+          </a:p>
+          <a:p>
+            <a:pPr marL="0" indent="0">
+              <a:buNone/>
+            </a:pPr>
+            <a:r>
+              <a:rPr lang="en-US" dirty="0" smtClean="0">
+                <a:latin typeface="Consolas" panose="020B0609020204030204" pitchFamily="49" charset="0"/>
+                <a:cs typeface="Consolas" panose="020B0609020204030204" pitchFamily="49" charset="0"/>
+              </a:rPr>
+              <a:t>&lt;/div&gt;</a:t>
+            </a:r>
+            <a:endParaRPr lang="en-US" dirty="0">
+              <a:latin typeface="Consolas" panose="020B0609020204030204" pitchFamily="49" charset="0"/>
+              <a:cs typeface="Consolas" panose="020B0609020204030204" pitchFamily="49" charset="0"/>
+            </a:endParaRPr>
+          </a:p>
+        </p:txBody>
+      </p:sp>
+    </p:spTree>
+    <p:extLst>
+      <p:ext uri="{BB962C8B-B14F-4D97-AF65-F5344CB8AC3E}">
+        <p14:creationId xmlns:p14="http://schemas.microsoft.com/office/powerpoint/2010/main" val="2748125800"/>
+      </p:ext>
+    </p:extLst>
+  </p:cSld>
+  <p:clrMapOvr>
+    <a:masterClrMapping/>
+  </p:clrMapOvr>
+</p:sld>
+</file>
+
+<file path=ppt/slides/slide28.xml><?xml version="1.0" encoding="utf-8"?>
+<p:sld xmlns:a="http://schemas.openxmlformats.org/drawingml/2006/main" xmlns:r="http://schemas.openxmlformats.org/officeDocument/2006/relationships" xmlns:p="http://schemas.openxmlformats.org/presentationml/2006/main">
+  <p:cSld>
+    <p:spTree>
+      <p:nvGrpSpPr>
+        <p:cNvPr id="1" name=""/>
+        <p:cNvGrpSpPr/>
+        <p:nvPr/>
+      </p:nvGrpSpPr>
+      <p:grpSpPr>
+        <a:xfrm>
+          <a:off x="0" y="0"/>
+          <a:ext cx="0" cy="0"/>
+          <a:chOff x="0" y="0"/>
+          <a:chExt cx="0" cy="0"/>
+        </a:xfrm>
+      </p:grpSpPr>
+      <p:sp>
+        <p:nvSpPr>
+          <p:cNvPr id="2" name="Title 1"/>
+          <p:cNvSpPr>
+            <a:spLocks noGrp="1"/>
+          </p:cNvSpPr>
+          <p:nvPr>
+            <p:ph type="title"/>
+          </p:nvPr>
+        </p:nvSpPr>
+        <p:spPr/>
+        <p:txBody>
+          <a:bodyPr/>
+          <a:lstStyle/>
+          <a:p>
+            <a:r>
+              <a:rPr lang="en-US" dirty="0" smtClean="0"/>
+              <a:t>Routing</a:t>
+            </a:r>
+            <a:endParaRPr lang="en-US" dirty="0"/>
+          </a:p>
+        </p:txBody>
+      </p:sp>
+      <p:sp>
+        <p:nvSpPr>
+          <p:cNvPr id="3" name="Content Placeholder 2"/>
+          <p:cNvSpPr>
+            <a:spLocks noGrp="1"/>
+          </p:cNvSpPr>
+          <p:nvPr>
+            <p:ph idx="1"/>
+          </p:nvPr>
+        </p:nvSpPr>
+        <p:spPr/>
+        <p:txBody>
+          <a:bodyPr>
+            <a:normAutofit/>
+          </a:bodyPr>
+          <a:lstStyle/>
+          <a:p>
+            <a:pPr marL="0" indent="0">
+              <a:buNone/>
+            </a:pPr>
+            <a:r>
+              <a:rPr lang="en-US" sz="2000" dirty="0" err="1">
+                <a:latin typeface="Consolas" panose="020B0609020204030204" pitchFamily="49" charset="0"/>
+                <a:cs typeface="Consolas" panose="020B0609020204030204" pitchFamily="49" charset="0"/>
+              </a:rPr>
+              <a:t>config</a:t>
+            </a:r>
+            <a:r>
+              <a:rPr lang="en-US" sz="2000" dirty="0">
+                <a:latin typeface="Consolas" panose="020B0609020204030204" pitchFamily="49" charset="0"/>
+                <a:cs typeface="Consolas" panose="020B0609020204030204" pitchFamily="49" charset="0"/>
+              </a:rPr>
+              <a:t>(['$</a:t>
+            </a:r>
+            <a:r>
+              <a:rPr lang="en-US" sz="2000" dirty="0" err="1">
+                <a:latin typeface="Consolas" panose="020B0609020204030204" pitchFamily="49" charset="0"/>
+                <a:cs typeface="Consolas" panose="020B0609020204030204" pitchFamily="49" charset="0"/>
+              </a:rPr>
+              <a:t>routeProvider</a:t>
+            </a:r>
+            <a:r>
+              <a:rPr lang="en-US" sz="2000" dirty="0">
+                <a:latin typeface="Consolas" panose="020B0609020204030204" pitchFamily="49" charset="0"/>
+                <a:cs typeface="Consolas" panose="020B0609020204030204" pitchFamily="49" charset="0"/>
+              </a:rPr>
+              <a:t>', function($</a:t>
+            </a:r>
+            <a:r>
+              <a:rPr lang="en-US" sz="2000" dirty="0" err="1">
+                <a:latin typeface="Consolas" panose="020B0609020204030204" pitchFamily="49" charset="0"/>
+                <a:cs typeface="Consolas" panose="020B0609020204030204" pitchFamily="49" charset="0"/>
+              </a:rPr>
+              <a:t>routeProvider</a:t>
+            </a:r>
+            <a:r>
+              <a:rPr lang="en-US" sz="2000" dirty="0">
+                <a:latin typeface="Consolas" panose="020B0609020204030204" pitchFamily="49" charset="0"/>
+                <a:cs typeface="Consolas" panose="020B0609020204030204" pitchFamily="49" charset="0"/>
+              </a:rPr>
+              <a:t>) {</a:t>
+            </a:r>
+          </a:p>
+          <a:p>
+            <a:pPr marL="0" indent="0">
+              <a:buNone/>
+            </a:pPr>
+            <a:r>
+              <a:rPr lang="en-US" sz="2000" dirty="0">
+                <a:latin typeface="Consolas" panose="020B0609020204030204" pitchFamily="49" charset="0"/>
+                <a:cs typeface="Consolas" panose="020B0609020204030204" pitchFamily="49" charset="0"/>
+              </a:rPr>
+              <a:t>  $</a:t>
+            </a:r>
+            <a:r>
+              <a:rPr lang="en-US" sz="2000" dirty="0" err="1">
+                <a:latin typeface="Consolas" panose="020B0609020204030204" pitchFamily="49" charset="0"/>
+                <a:cs typeface="Consolas" panose="020B0609020204030204" pitchFamily="49" charset="0"/>
+              </a:rPr>
+              <a:t>routeProvider.when</a:t>
+            </a:r>
+            <a:r>
+              <a:rPr lang="en-US" sz="2000" dirty="0" smtClean="0">
+                <a:latin typeface="Consolas" panose="020B0609020204030204" pitchFamily="49" charset="0"/>
+                <a:cs typeface="Consolas" panose="020B0609020204030204" pitchFamily="49" charset="0"/>
+              </a:rPr>
+              <a:t>('/orders', </a:t>
+            </a:r>
+            <a:r>
+              <a:rPr lang="en-US" sz="2000" dirty="0">
+                <a:latin typeface="Consolas" panose="020B0609020204030204" pitchFamily="49" charset="0"/>
+                <a:cs typeface="Consolas" panose="020B0609020204030204" pitchFamily="49" charset="0"/>
+              </a:rPr>
+              <a:t>{</a:t>
+            </a:r>
+            <a:r>
+              <a:rPr lang="en-US" sz="2000" dirty="0" err="1">
+                <a:latin typeface="Consolas" panose="020B0609020204030204" pitchFamily="49" charset="0"/>
+                <a:cs typeface="Consolas" panose="020B0609020204030204" pitchFamily="49" charset="0"/>
+              </a:rPr>
+              <a:t>templateUrl</a:t>
+            </a:r>
+            <a:r>
+              <a:rPr lang="en-US" sz="2000" dirty="0">
+                <a:latin typeface="Consolas" panose="020B0609020204030204" pitchFamily="49" charset="0"/>
+                <a:cs typeface="Consolas" panose="020B0609020204030204" pitchFamily="49" charset="0"/>
+              </a:rPr>
+              <a:t>: </a:t>
+            </a:r>
+            <a:r>
+              <a:rPr lang="en-US" sz="2000" dirty="0" smtClean="0">
+                <a:latin typeface="Consolas" panose="020B0609020204030204" pitchFamily="49" charset="0"/>
+                <a:cs typeface="Consolas" panose="020B0609020204030204" pitchFamily="49" charset="0"/>
+              </a:rPr>
+              <a:t>'partials/orders.html</a:t>
+            </a:r>
+            <a:r>
+              <a:rPr lang="en-US" sz="2000" dirty="0">
+                <a:latin typeface="Consolas" panose="020B0609020204030204" pitchFamily="49" charset="0"/>
+                <a:cs typeface="Consolas" panose="020B0609020204030204" pitchFamily="49" charset="0"/>
+              </a:rPr>
+              <a:t>', controller: '</a:t>
+            </a:r>
+            <a:r>
+              <a:rPr lang="en-US" sz="2000" dirty="0" err="1" smtClean="0">
+                <a:latin typeface="Consolas" panose="020B0609020204030204" pitchFamily="49" charset="0"/>
+                <a:cs typeface="Consolas" panose="020B0609020204030204" pitchFamily="49" charset="0"/>
+              </a:rPr>
+              <a:t>OrdersCtrl</a:t>
+            </a:r>
+            <a:r>
+              <a:rPr lang="en-US" sz="2000" dirty="0" smtClean="0">
+                <a:latin typeface="Consolas" panose="020B0609020204030204" pitchFamily="49" charset="0"/>
+                <a:cs typeface="Consolas" panose="020B0609020204030204" pitchFamily="49" charset="0"/>
+              </a:rPr>
+              <a:t>'});</a:t>
+            </a:r>
+            <a:endParaRPr lang="en-US" sz="2000" dirty="0">
+              <a:latin typeface="Consolas" panose="020B0609020204030204" pitchFamily="49" charset="0"/>
+              <a:cs typeface="Consolas" panose="020B0609020204030204" pitchFamily="49" charset="0"/>
+            </a:endParaRPr>
+          </a:p>
+          <a:p>
+            <a:pPr marL="0" indent="0">
+              <a:buNone/>
+            </a:pPr>
+            <a:r>
+              <a:rPr lang="en-US" sz="2000" dirty="0">
+                <a:latin typeface="Consolas" panose="020B0609020204030204" pitchFamily="49" charset="0"/>
+                <a:cs typeface="Consolas" panose="020B0609020204030204" pitchFamily="49" charset="0"/>
+              </a:rPr>
+              <a:t>  $</a:t>
+            </a:r>
+            <a:r>
+              <a:rPr lang="en-US" sz="2000" dirty="0" err="1">
+                <a:latin typeface="Consolas" panose="020B0609020204030204" pitchFamily="49" charset="0"/>
+                <a:cs typeface="Consolas" panose="020B0609020204030204" pitchFamily="49" charset="0"/>
+              </a:rPr>
+              <a:t>routeProvider.when</a:t>
+            </a:r>
+            <a:r>
+              <a:rPr lang="en-US" sz="2000" dirty="0" smtClean="0">
+                <a:latin typeface="Consolas" panose="020B0609020204030204" pitchFamily="49" charset="0"/>
+                <a:cs typeface="Consolas" panose="020B0609020204030204" pitchFamily="49" charset="0"/>
+              </a:rPr>
+              <a:t>('/catalog', </a:t>
+            </a:r>
+            <a:r>
+              <a:rPr lang="en-US" sz="2000" dirty="0">
+                <a:latin typeface="Consolas" panose="020B0609020204030204" pitchFamily="49" charset="0"/>
+                <a:cs typeface="Consolas" panose="020B0609020204030204" pitchFamily="49" charset="0"/>
+              </a:rPr>
+              <a:t>{</a:t>
+            </a:r>
+            <a:r>
+              <a:rPr lang="en-US" sz="2000" dirty="0" err="1">
+                <a:latin typeface="Consolas" panose="020B0609020204030204" pitchFamily="49" charset="0"/>
+                <a:cs typeface="Consolas" panose="020B0609020204030204" pitchFamily="49" charset="0"/>
+              </a:rPr>
+              <a:t>templateUrl</a:t>
+            </a:r>
+            <a:r>
+              <a:rPr lang="en-US" sz="2000" dirty="0">
+                <a:latin typeface="Consolas" panose="020B0609020204030204" pitchFamily="49" charset="0"/>
+                <a:cs typeface="Consolas" panose="020B0609020204030204" pitchFamily="49" charset="0"/>
+              </a:rPr>
+              <a:t>: </a:t>
+            </a:r>
+            <a:r>
+              <a:rPr lang="en-US" sz="2000" dirty="0" smtClean="0">
+                <a:latin typeface="Consolas" panose="020B0609020204030204" pitchFamily="49" charset="0"/>
+                <a:cs typeface="Consolas" panose="020B0609020204030204" pitchFamily="49" charset="0"/>
+              </a:rPr>
+              <a:t>'partials/catalog.html</a:t>
+            </a:r>
+            <a:r>
+              <a:rPr lang="en-US" sz="2000" dirty="0">
+                <a:latin typeface="Consolas" panose="020B0609020204030204" pitchFamily="49" charset="0"/>
+                <a:cs typeface="Consolas" panose="020B0609020204030204" pitchFamily="49" charset="0"/>
+              </a:rPr>
+              <a:t>', controller: </a:t>
+            </a:r>
+            <a:r>
+              <a:rPr lang="en-US" sz="2000" dirty="0" smtClean="0">
+                <a:latin typeface="Consolas" panose="020B0609020204030204" pitchFamily="49" charset="0"/>
+                <a:cs typeface="Consolas" panose="020B0609020204030204" pitchFamily="49" charset="0"/>
+              </a:rPr>
+              <a:t>‘</a:t>
+            </a:r>
+            <a:r>
+              <a:rPr lang="en-US" sz="2000" dirty="0" err="1" smtClean="0">
+                <a:latin typeface="Consolas" panose="020B0609020204030204" pitchFamily="49" charset="0"/>
+                <a:cs typeface="Consolas" panose="020B0609020204030204" pitchFamily="49" charset="0"/>
+              </a:rPr>
+              <a:t>CatalogCtrl</a:t>
+            </a:r>
+            <a:r>
+              <a:rPr lang="en-US" sz="2000" dirty="0" smtClean="0">
+                <a:latin typeface="Consolas" panose="020B0609020204030204" pitchFamily="49" charset="0"/>
+                <a:cs typeface="Consolas" panose="020B0609020204030204" pitchFamily="49" charset="0"/>
+              </a:rPr>
+              <a:t>'});</a:t>
+            </a:r>
+            <a:endParaRPr lang="en-US" sz="2000" dirty="0">
+              <a:latin typeface="Consolas" panose="020B0609020204030204" pitchFamily="49" charset="0"/>
+              <a:cs typeface="Consolas" panose="020B0609020204030204" pitchFamily="49" charset="0"/>
+            </a:endParaRPr>
+          </a:p>
+          <a:p>
+            <a:pPr marL="0" indent="0">
+              <a:buNone/>
+            </a:pPr>
+            <a:r>
+              <a:rPr lang="en-US" sz="2000" dirty="0" smtClean="0">
+                <a:latin typeface="Consolas" panose="020B0609020204030204" pitchFamily="49" charset="0"/>
+                <a:cs typeface="Consolas" panose="020B0609020204030204" pitchFamily="49" charset="0"/>
+              </a:rPr>
+              <a:t>$</a:t>
+            </a:r>
+            <a:r>
+              <a:rPr lang="en-US" sz="2000" dirty="0" err="1">
+                <a:latin typeface="Consolas" panose="020B0609020204030204" pitchFamily="49" charset="0"/>
+                <a:cs typeface="Consolas" panose="020B0609020204030204" pitchFamily="49" charset="0"/>
+              </a:rPr>
+              <a:t>routeProvider.otherwise</a:t>
+            </a:r>
+            <a:r>
+              <a:rPr lang="en-US" sz="2000" dirty="0">
+                <a:latin typeface="Consolas" panose="020B0609020204030204" pitchFamily="49" charset="0"/>
+                <a:cs typeface="Consolas" panose="020B0609020204030204" pitchFamily="49" charset="0"/>
+              </a:rPr>
+              <a:t>({</a:t>
+            </a:r>
+            <a:r>
+              <a:rPr lang="en-US" sz="2000" dirty="0" err="1">
+                <a:latin typeface="Consolas" panose="020B0609020204030204" pitchFamily="49" charset="0"/>
+                <a:cs typeface="Consolas" panose="020B0609020204030204" pitchFamily="49" charset="0"/>
+              </a:rPr>
+              <a:t>redirectTo</a:t>
+            </a:r>
+            <a:r>
+              <a:rPr lang="en-US" sz="2000" dirty="0">
+                <a:latin typeface="Consolas" panose="020B0609020204030204" pitchFamily="49" charset="0"/>
+                <a:cs typeface="Consolas" panose="020B0609020204030204" pitchFamily="49" charset="0"/>
+              </a:rPr>
+              <a:t>: </a:t>
+            </a:r>
+            <a:r>
+              <a:rPr lang="en-US" sz="2000" dirty="0" smtClean="0">
+                <a:latin typeface="Consolas" panose="020B0609020204030204" pitchFamily="49" charset="0"/>
+                <a:cs typeface="Consolas" panose="020B0609020204030204" pitchFamily="49" charset="0"/>
+              </a:rPr>
+              <a:t>'/catalog'});</a:t>
+            </a:r>
+            <a:endParaRPr lang="en-US" sz="2000" dirty="0">
+              <a:latin typeface="Consolas" panose="020B0609020204030204" pitchFamily="49" charset="0"/>
+              <a:cs typeface="Consolas" panose="020B0609020204030204" pitchFamily="49" charset="0"/>
+            </a:endParaRPr>
+          </a:p>
+          <a:p>
+            <a:pPr marL="0" indent="0">
+              <a:buNone/>
+            </a:pPr>
+            <a:r>
+              <a:rPr lang="en-US" sz="2000" dirty="0">
+                <a:latin typeface="Consolas" panose="020B0609020204030204" pitchFamily="49" charset="0"/>
+                <a:cs typeface="Consolas" panose="020B0609020204030204" pitchFamily="49" charset="0"/>
+              </a:rPr>
+              <a:t>}]);</a:t>
+            </a:r>
+          </a:p>
+          <a:p>
+            <a:pPr marL="0" indent="0">
+              <a:buNone/>
+            </a:pPr>
+            <a:endParaRPr lang="en-US" sz="2000" dirty="0">
+              <a:latin typeface="Consolas" panose="020B0609020204030204" pitchFamily="49" charset="0"/>
+              <a:cs typeface="Consolas" panose="020B0609020204030204" pitchFamily="49" charset="0"/>
+            </a:endParaRPr>
+          </a:p>
+        </p:txBody>
+      </p:sp>
+    </p:spTree>
+    <p:extLst>
+      <p:ext uri="{BB962C8B-B14F-4D97-AF65-F5344CB8AC3E}">
+        <p14:creationId xmlns:p14="http://schemas.microsoft.com/office/powerpoint/2010/main" val="3529999232"/>
+      </p:ext>
+    </p:extLst>
+  </p:cSld>
+  <p:clrMapOvr>
+    <a:masterClrMapping/>
+  </p:clrMapOvr>
+</p:sld>
+</file>
+
+<file path=ppt/slides/slide29.xml><?xml version="1.0" encoding="utf-8"?>
+<p:sld xmlns:a="http://schemas.openxmlformats.org/drawingml/2006/main" xmlns:r="http://schemas.openxmlformats.org/officeDocument/2006/relationships" xmlns:p="http://schemas.openxmlformats.org/presentationml/2006/main">
+  <p:cSld>
+    <p:spTree>
+      <p:nvGrpSpPr>
+        <p:cNvPr id="1" name=""/>
+        <p:cNvGrpSpPr/>
+        <p:nvPr/>
+      </p:nvGrpSpPr>
+      <p:grpSpPr>
+        <a:xfrm>
+          <a:off x="0" y="0"/>
+          <a:ext cx="0" cy="0"/>
+          <a:chOff x="0" y="0"/>
+          <a:chExt cx="0" cy="0"/>
+        </a:xfrm>
+      </p:grpSpPr>
+      <p:sp>
+        <p:nvSpPr>
+          <p:cNvPr id="2" name="Title 1"/>
+          <p:cNvSpPr>
+            <a:spLocks noGrp="1"/>
+          </p:cNvSpPr>
+          <p:nvPr>
+            <p:ph type="title"/>
+          </p:nvPr>
+        </p:nvSpPr>
+        <p:spPr/>
+        <p:txBody>
+          <a:bodyPr/>
+          <a:lstStyle/>
+          <a:p>
+            <a:r>
+              <a:rPr lang="en-US" dirty="0" smtClean="0"/>
+              <a:t>Unit testing</a:t>
+            </a:r>
+            <a:endParaRPr lang="en-US" dirty="0"/>
+          </a:p>
+        </p:txBody>
+      </p:sp>
+      <p:sp>
+        <p:nvSpPr>
+          <p:cNvPr id="3" name="Content Placeholder 2"/>
+          <p:cNvSpPr>
+            <a:spLocks noGrp="1"/>
+          </p:cNvSpPr>
+          <p:nvPr>
+            <p:ph idx="1"/>
+          </p:nvPr>
+        </p:nvSpPr>
+        <p:spPr/>
+        <p:txBody>
+          <a:bodyPr/>
+          <a:lstStyle/>
+          <a:p>
+            <a:r>
+              <a:rPr lang="en-US" dirty="0" smtClean="0"/>
+              <a:t>Angular has a nice testing framework baked in</a:t>
+            </a:r>
+          </a:p>
+          <a:p>
+            <a:r>
+              <a:rPr lang="en-US" dirty="0" smtClean="0"/>
+              <a:t>Angular supports both unit and end to end tests out of the box</a:t>
+            </a:r>
+            <a:endParaRPr lang="en-US" dirty="0"/>
+          </a:p>
+        </p:txBody>
+      </p:sp>
+    </p:spTree>
+    <p:extLst>
+      <p:ext uri="{BB962C8B-B14F-4D97-AF65-F5344CB8AC3E}">
+        <p14:creationId xmlns:p14="http://schemas.microsoft.com/office/powerpoint/2010/main" val="2386739934"/>
       </p:ext>
     </p:extLst>
   </p:cSld>
@@ -5168,6 +5644,393 @@
 </p:sld>
 </file>
 
+<file path=ppt/slides/slide30.xml><?xml version="1.0" encoding="utf-8"?>
+<p:sld xmlns:a="http://schemas.openxmlformats.org/drawingml/2006/main" xmlns:r="http://schemas.openxmlformats.org/officeDocument/2006/relationships" xmlns:p="http://schemas.openxmlformats.org/presentationml/2006/main">
+  <p:cSld>
+    <p:spTree>
+      <p:nvGrpSpPr>
+        <p:cNvPr id="1" name=""/>
+        <p:cNvGrpSpPr/>
+        <p:nvPr/>
+      </p:nvGrpSpPr>
+      <p:grpSpPr>
+        <a:xfrm>
+          <a:off x="0" y="0"/>
+          <a:ext cx="0" cy="0"/>
+          <a:chOff x="0" y="0"/>
+          <a:chExt cx="0" cy="0"/>
+        </a:xfrm>
+      </p:grpSpPr>
+      <p:sp>
+        <p:nvSpPr>
+          <p:cNvPr id="2" name="Title 1"/>
+          <p:cNvSpPr>
+            <a:spLocks noGrp="1"/>
+          </p:cNvSpPr>
+          <p:nvPr>
+            <p:ph type="title"/>
+          </p:nvPr>
+        </p:nvSpPr>
+        <p:spPr/>
+        <p:txBody>
+          <a:bodyPr/>
+          <a:lstStyle/>
+          <a:p>
+            <a:r>
+              <a:rPr lang="en-US" dirty="0" smtClean="0"/>
+              <a:t>Other frameworks</a:t>
+            </a:r>
+            <a:endParaRPr lang="en-US" dirty="0"/>
+          </a:p>
+        </p:txBody>
+      </p:sp>
+      <p:sp>
+        <p:nvSpPr>
+          <p:cNvPr id="3" name="Content Placeholder 2"/>
+          <p:cNvSpPr>
+            <a:spLocks noGrp="1"/>
+          </p:cNvSpPr>
+          <p:nvPr>
+            <p:ph idx="1"/>
+          </p:nvPr>
+        </p:nvSpPr>
+        <p:spPr/>
+        <p:txBody>
+          <a:bodyPr/>
+          <a:lstStyle/>
+          <a:p>
+            <a:r>
+              <a:rPr lang="en-US" dirty="0" smtClean="0"/>
+              <a:t>Backbone </a:t>
+            </a:r>
+          </a:p>
+          <a:p>
+            <a:pPr lvl="1"/>
+            <a:r>
+              <a:rPr lang="en-US" dirty="0">
+                <a:hlinkClick r:id="rId2"/>
+              </a:rPr>
+              <a:t>http://backbonejs.org</a:t>
+            </a:r>
+            <a:r>
+              <a:rPr lang="en-US" dirty="0" smtClean="0">
+                <a:hlinkClick r:id="rId2"/>
+              </a:rPr>
+              <a:t>/</a:t>
+            </a:r>
+            <a:endParaRPr lang="en-US" dirty="0" smtClean="0"/>
+          </a:p>
+          <a:p>
+            <a:r>
+              <a:rPr lang="en-US" dirty="0" err="1" smtClean="0"/>
+              <a:t>Durandal</a:t>
+            </a:r>
+            <a:endParaRPr lang="en-US" dirty="0" smtClean="0"/>
+          </a:p>
+          <a:p>
+            <a:pPr lvl="1"/>
+            <a:r>
+              <a:rPr lang="en-US" dirty="0">
+                <a:hlinkClick r:id="rId3"/>
+              </a:rPr>
+              <a:t>http://durandaljs.com</a:t>
+            </a:r>
+            <a:r>
+              <a:rPr lang="en-US" dirty="0" smtClean="0">
+                <a:hlinkClick r:id="rId3"/>
+              </a:rPr>
+              <a:t>/</a:t>
+            </a:r>
+            <a:endParaRPr lang="en-US" dirty="0" smtClean="0"/>
+          </a:p>
+          <a:p>
+            <a:pPr lvl="1"/>
+            <a:endParaRPr lang="en-US" dirty="0"/>
+          </a:p>
+        </p:txBody>
+      </p:sp>
+    </p:spTree>
+    <p:extLst>
+      <p:ext uri="{BB962C8B-B14F-4D97-AF65-F5344CB8AC3E}">
+        <p14:creationId xmlns:p14="http://schemas.microsoft.com/office/powerpoint/2010/main" val="2904819385"/>
+      </p:ext>
+    </p:extLst>
+  </p:cSld>
+  <p:clrMapOvr>
+    <a:masterClrMapping/>
+  </p:clrMapOvr>
+</p:sld>
+</file>
+
+<file path=ppt/slides/slide31.xml><?xml version="1.0" encoding="utf-8"?>
+<p:sld xmlns:a="http://schemas.openxmlformats.org/drawingml/2006/main" xmlns:r="http://schemas.openxmlformats.org/officeDocument/2006/relationships" xmlns:p="http://schemas.openxmlformats.org/presentationml/2006/main">
+  <p:cSld>
+    <p:spTree>
+      <p:nvGrpSpPr>
+        <p:cNvPr id="1" name=""/>
+        <p:cNvGrpSpPr/>
+        <p:nvPr/>
+      </p:nvGrpSpPr>
+      <p:grpSpPr>
+        <a:xfrm>
+          <a:off x="0" y="0"/>
+          <a:ext cx="0" cy="0"/>
+          <a:chOff x="0" y="0"/>
+          <a:chExt cx="0" cy="0"/>
+        </a:xfrm>
+      </p:grpSpPr>
+      <p:sp>
+        <p:nvSpPr>
+          <p:cNvPr id="2" name="Title 1"/>
+          <p:cNvSpPr>
+            <a:spLocks noGrp="1"/>
+          </p:cNvSpPr>
+          <p:nvPr>
+            <p:ph type="title"/>
+          </p:nvPr>
+        </p:nvSpPr>
+        <p:spPr/>
+        <p:txBody>
+          <a:bodyPr/>
+          <a:lstStyle/>
+          <a:p>
+            <a:r>
+              <a:rPr lang="en-US" dirty="0" smtClean="0"/>
+              <a:t>Smaller frameworks</a:t>
+            </a:r>
+            <a:endParaRPr lang="en-US" dirty="0"/>
+          </a:p>
+        </p:txBody>
+      </p:sp>
+      <p:sp>
+        <p:nvSpPr>
+          <p:cNvPr id="3" name="Content Placeholder 2"/>
+          <p:cNvSpPr>
+            <a:spLocks noGrp="1"/>
+          </p:cNvSpPr>
+          <p:nvPr>
+            <p:ph idx="1"/>
+          </p:nvPr>
+        </p:nvSpPr>
+        <p:spPr/>
+        <p:txBody>
+          <a:bodyPr/>
+          <a:lstStyle/>
+          <a:p>
+            <a:r>
+              <a:rPr lang="en-US" dirty="0" smtClean="0"/>
+              <a:t>Knockout – data binding</a:t>
+            </a:r>
+          </a:p>
+          <a:p>
+            <a:r>
+              <a:rPr lang="en-US" dirty="0" smtClean="0"/>
+              <a:t>Sammy – routing+</a:t>
+            </a:r>
+          </a:p>
+          <a:p>
+            <a:r>
+              <a:rPr lang="en-US" dirty="0" smtClean="0"/>
+              <a:t>Require – module loading</a:t>
+            </a:r>
+            <a:endParaRPr lang="en-US" dirty="0"/>
+          </a:p>
+        </p:txBody>
+      </p:sp>
+    </p:spTree>
+    <p:extLst>
+      <p:ext uri="{BB962C8B-B14F-4D97-AF65-F5344CB8AC3E}">
+        <p14:creationId xmlns:p14="http://schemas.microsoft.com/office/powerpoint/2010/main" val="1851596167"/>
+      </p:ext>
+    </p:extLst>
+  </p:cSld>
+  <p:clrMapOvr>
+    <a:masterClrMapping/>
+  </p:clrMapOvr>
+</p:sld>
+</file>
+
+<file path=ppt/slides/slide32.xml><?xml version="1.0" encoding="utf-8"?>
+<p:sld xmlns:a="http://schemas.openxmlformats.org/drawingml/2006/main" xmlns:r="http://schemas.openxmlformats.org/officeDocument/2006/relationships" xmlns:p="http://schemas.openxmlformats.org/presentationml/2006/main">
+  <p:cSld>
+    <p:spTree>
+      <p:nvGrpSpPr>
+        <p:cNvPr id="1" name=""/>
+        <p:cNvGrpSpPr/>
+        <p:nvPr/>
+      </p:nvGrpSpPr>
+      <p:grpSpPr>
+        <a:xfrm>
+          <a:off x="0" y="0"/>
+          <a:ext cx="0" cy="0"/>
+          <a:chOff x="0" y="0"/>
+          <a:chExt cx="0" cy="0"/>
+        </a:xfrm>
+      </p:grpSpPr>
+      <p:sp>
+        <p:nvSpPr>
+          <p:cNvPr id="2" name="Title 1"/>
+          <p:cNvSpPr>
+            <a:spLocks noGrp="1"/>
+          </p:cNvSpPr>
+          <p:nvPr>
+            <p:ph type="title"/>
+          </p:nvPr>
+        </p:nvSpPr>
+        <p:spPr/>
+        <p:txBody>
+          <a:bodyPr/>
+          <a:lstStyle/>
+          <a:p>
+            <a:r>
+              <a:rPr lang="en-US" smtClean="0"/>
+              <a:t>Node</a:t>
+            </a:r>
+            <a:endParaRPr lang="en-US" dirty="0"/>
+          </a:p>
+        </p:txBody>
+      </p:sp>
+      <p:sp>
+        <p:nvSpPr>
+          <p:cNvPr id="3" name="Text Placeholder 2"/>
+          <p:cNvSpPr>
+            <a:spLocks noGrp="1"/>
+          </p:cNvSpPr>
+          <p:nvPr>
+            <p:ph type="body" idx="1"/>
+          </p:nvPr>
+        </p:nvSpPr>
+        <p:spPr/>
+        <p:txBody>
+          <a:bodyPr/>
+          <a:lstStyle/>
+          <a:p>
+            <a:endParaRPr lang="en-US"/>
+          </a:p>
+        </p:txBody>
+      </p:sp>
+    </p:spTree>
+    <p:extLst>
+      <p:ext uri="{BB962C8B-B14F-4D97-AF65-F5344CB8AC3E}">
+        <p14:creationId xmlns:p14="http://schemas.microsoft.com/office/powerpoint/2010/main" val="1312284567"/>
+      </p:ext>
+    </p:extLst>
+  </p:cSld>
+  <p:clrMapOvr>
+    <a:masterClrMapping/>
+  </p:clrMapOvr>
+</p:sld>
+</file>
+
+<file path=ppt/slides/slide33.xml><?xml version="1.0" encoding="utf-8"?>
+<p:sld xmlns:a="http://schemas.openxmlformats.org/drawingml/2006/main" xmlns:r="http://schemas.openxmlformats.org/officeDocument/2006/relationships" xmlns:p="http://schemas.openxmlformats.org/presentationml/2006/main">
+  <p:cSld>
+    <p:spTree>
+      <p:nvGrpSpPr>
+        <p:cNvPr id="1" name=""/>
+        <p:cNvGrpSpPr/>
+        <p:nvPr/>
+      </p:nvGrpSpPr>
+      <p:grpSpPr>
+        <a:xfrm>
+          <a:off x="0" y="0"/>
+          <a:ext cx="0" cy="0"/>
+          <a:chOff x="0" y="0"/>
+          <a:chExt cx="0" cy="0"/>
+        </a:xfrm>
+      </p:grpSpPr>
+      <p:sp>
+        <p:nvSpPr>
+          <p:cNvPr id="4" name="Title 3"/>
+          <p:cNvSpPr>
+            <a:spLocks noGrp="1"/>
+          </p:cNvSpPr>
+          <p:nvPr>
+            <p:ph type="title"/>
+          </p:nvPr>
+        </p:nvSpPr>
+        <p:spPr/>
+        <p:txBody>
+          <a:bodyPr/>
+          <a:lstStyle/>
+          <a:p>
+            <a:r>
+              <a:rPr lang="en-US" dirty="0" smtClean="0"/>
+              <a:t>JavaScript on the Server</a:t>
+            </a:r>
+            <a:endParaRPr lang="en-US" dirty="0"/>
+          </a:p>
+        </p:txBody>
+      </p:sp>
+      <p:sp>
+        <p:nvSpPr>
+          <p:cNvPr id="5" name="Content Placeholder 4"/>
+          <p:cNvSpPr>
+            <a:spLocks noGrp="1"/>
+          </p:cNvSpPr>
+          <p:nvPr>
+            <p:ph idx="1"/>
+          </p:nvPr>
+        </p:nvSpPr>
+        <p:spPr/>
+        <p:txBody>
+          <a:bodyPr/>
+          <a:lstStyle/>
+          <a:p>
+            <a:r>
+              <a:rPr lang="en-US" dirty="0" err="1" smtClean="0"/>
+              <a:t>sockets.io</a:t>
+            </a:r>
+            <a:endParaRPr lang="en-US" dirty="0" smtClean="0"/>
+          </a:p>
+          <a:p>
+            <a:pPr lvl="1"/>
+            <a:r>
+              <a:rPr lang="en-US" dirty="0" smtClean="0"/>
+              <a:t>Push notifications from the server</a:t>
+            </a:r>
+          </a:p>
+          <a:p>
+            <a:pPr lvl="1"/>
+            <a:endParaRPr lang="en-US" dirty="0"/>
+          </a:p>
+          <a:p>
+            <a:r>
+              <a:rPr lang="en-US" dirty="0" smtClean="0"/>
+              <a:t>Low footprint</a:t>
+            </a:r>
+          </a:p>
+          <a:p>
+            <a:r>
+              <a:rPr lang="en-US" dirty="0" smtClean="0"/>
+              <a:t>Fast</a:t>
+            </a:r>
+          </a:p>
+          <a:p>
+            <a:endParaRPr lang="en-US" dirty="0"/>
+          </a:p>
+          <a:p>
+            <a:r>
+              <a:rPr lang="en-US" dirty="0" smtClean="0"/>
+              <a:t>Very early</a:t>
+            </a:r>
+            <a:endParaRPr lang="en-US" dirty="0"/>
+          </a:p>
+        </p:txBody>
+      </p:sp>
+    </p:spTree>
+    <p:extLst>
+      <p:ext uri="{BB962C8B-B14F-4D97-AF65-F5344CB8AC3E}">
+        <p14:creationId xmlns:p14="http://schemas.microsoft.com/office/powerpoint/2010/main" val="139108835"/>
+      </p:ext>
+    </p:extLst>
+  </p:cSld>
+  <p:clrMapOvr>
+    <a:masterClrMapping/>
+  </p:clrMapOvr>
+</p:sld>
+</file>
+
 <file path=ppt/slides/slide4.xml><?xml version="1.0" encoding="utf-8"?>
 <p:sld xmlns:a="http://schemas.openxmlformats.org/drawingml/2006/main" xmlns:r="http://schemas.openxmlformats.org/officeDocument/2006/relationships" xmlns:p="http://schemas.openxmlformats.org/presentationml/2006/main">
   <p:cSld>
@@ -5352,6 +6215,189 @@
 </file>
 
 <file path=ppt/slides/slide6.xml><?xml version="1.0" encoding="utf-8"?>
+<p:sld xmlns:a="http://schemas.openxmlformats.org/drawingml/2006/main" xmlns:r="http://schemas.openxmlformats.org/officeDocument/2006/relationships" xmlns:p="http://schemas.openxmlformats.org/presentationml/2006/main">
+  <p:cSld>
+    <p:spTree>
+      <p:nvGrpSpPr>
+        <p:cNvPr id="1" name=""/>
+        <p:cNvGrpSpPr/>
+        <p:nvPr/>
+      </p:nvGrpSpPr>
+      <p:grpSpPr>
+        <a:xfrm>
+          <a:off x="0" y="0"/>
+          <a:ext cx="0" cy="0"/>
+          <a:chOff x="0" y="0"/>
+          <a:chExt cx="0" cy="0"/>
+        </a:xfrm>
+      </p:grpSpPr>
+      <p:sp>
+        <p:nvSpPr>
+          <p:cNvPr id="4" name="Title 3"/>
+          <p:cNvSpPr>
+            <a:spLocks noGrp="1"/>
+          </p:cNvSpPr>
+          <p:nvPr>
+            <p:ph type="ctrTitle"/>
+          </p:nvPr>
+        </p:nvSpPr>
+        <p:spPr/>
+        <p:txBody>
+          <a:bodyPr>
+            <a:normAutofit/>
+          </a:bodyPr>
+          <a:lstStyle/>
+          <a:p>
+            <a:r>
+              <a:rPr lang="en-US" dirty="0"/>
+              <a:t>JavaScript</a:t>
+            </a:r>
+            <a:br>
+              <a:rPr lang="en-US" dirty="0"/>
+            </a:br>
+            <a:r>
+              <a:rPr lang="en-US" sz="3600" dirty="0"/>
+              <a:t>https://github.com/chadmichel/JavaScriptStuff</a:t>
+            </a:r>
+          </a:p>
+        </p:txBody>
+      </p:sp>
+      <p:sp>
+        <p:nvSpPr>
+          <p:cNvPr id="5" name="Subtitle 4"/>
+          <p:cNvSpPr>
+            <a:spLocks noGrp="1"/>
+          </p:cNvSpPr>
+          <p:nvPr>
+            <p:ph type="subTitle" idx="1"/>
+          </p:nvPr>
+        </p:nvSpPr>
+        <p:spPr/>
+        <p:txBody>
+          <a:bodyPr/>
+          <a:lstStyle/>
+          <a:p>
+            <a:endParaRPr lang="en-US"/>
+          </a:p>
+        </p:txBody>
+      </p:sp>
+    </p:spTree>
+    <p:extLst>
+      <p:ext uri="{BB962C8B-B14F-4D97-AF65-F5344CB8AC3E}">
+        <p14:creationId xmlns:p14="http://schemas.microsoft.com/office/powerpoint/2010/main" val="3733327754"/>
+      </p:ext>
+    </p:extLst>
+  </p:cSld>
+  <p:clrMapOvr>
+    <a:masterClrMapping/>
+  </p:clrMapOvr>
+</p:sld>
+</file>
+
+<file path=ppt/slides/slide7.xml><?xml version="1.0" encoding="utf-8"?>
+<p:sld xmlns:a="http://schemas.openxmlformats.org/drawingml/2006/main" xmlns:r="http://schemas.openxmlformats.org/officeDocument/2006/relationships" xmlns:p="http://schemas.openxmlformats.org/presentationml/2006/main">
+  <p:cSld>
+    <p:spTree>
+      <p:nvGrpSpPr>
+        <p:cNvPr id="1" name=""/>
+        <p:cNvGrpSpPr/>
+        <p:nvPr/>
+      </p:nvGrpSpPr>
+      <p:grpSpPr>
+        <a:xfrm>
+          <a:off x="0" y="0"/>
+          <a:ext cx="0" cy="0"/>
+          <a:chOff x="0" y="0"/>
+          <a:chExt cx="0" cy="0"/>
+        </a:xfrm>
+      </p:grpSpPr>
+      <p:sp>
+        <p:nvSpPr>
+          <p:cNvPr id="2" name="Title 1"/>
+          <p:cNvSpPr>
+            <a:spLocks noGrp="1"/>
+          </p:cNvSpPr>
+          <p:nvPr>
+            <p:ph type="title"/>
+          </p:nvPr>
+        </p:nvSpPr>
+        <p:spPr/>
+        <p:txBody>
+          <a:bodyPr/>
+          <a:lstStyle/>
+          <a:p>
+            <a:r>
+              <a:rPr lang="en-US" dirty="0" smtClean="0"/>
+              <a:t>What we are going to cover</a:t>
+            </a:r>
+            <a:endParaRPr lang="en-US" dirty="0"/>
+          </a:p>
+        </p:txBody>
+      </p:sp>
+      <p:sp>
+        <p:nvSpPr>
+          <p:cNvPr id="3" name="Content Placeholder 2"/>
+          <p:cNvSpPr>
+            <a:spLocks noGrp="1"/>
+          </p:cNvSpPr>
+          <p:nvPr>
+            <p:ph idx="1"/>
+          </p:nvPr>
+        </p:nvSpPr>
+        <p:spPr/>
+        <p:txBody>
+          <a:bodyPr/>
+          <a:lstStyle/>
+          <a:p>
+            <a:r>
+              <a:rPr lang="en-US" dirty="0" smtClean="0"/>
+              <a:t>JavaScript</a:t>
+            </a:r>
+          </a:p>
+          <a:p>
+            <a:r>
+              <a:rPr lang="en-US" dirty="0" smtClean="0"/>
+              <a:t>Best Practices</a:t>
+            </a:r>
+          </a:p>
+          <a:p>
+            <a:r>
+              <a:rPr lang="en-US" dirty="0" smtClean="0"/>
+              <a:t> TDD</a:t>
+            </a:r>
+          </a:p>
+          <a:p>
+            <a:r>
+              <a:rPr lang="en-US" dirty="0" smtClean="0"/>
+              <a:t>Single Page Applications</a:t>
+            </a:r>
+          </a:p>
+          <a:p>
+            <a:r>
+              <a:rPr lang="en-US" smtClean="0"/>
+              <a:t>Node</a:t>
+            </a:r>
+            <a:endParaRPr lang="en-US" dirty="0" smtClean="0"/>
+          </a:p>
+          <a:p>
+            <a:endParaRPr lang="en-US" dirty="0"/>
+          </a:p>
+        </p:txBody>
+      </p:sp>
+    </p:spTree>
+    <p:extLst>
+      <p:ext uri="{BB962C8B-B14F-4D97-AF65-F5344CB8AC3E}">
+        <p14:creationId xmlns:p14="http://schemas.microsoft.com/office/powerpoint/2010/main" val="3524299607"/>
+      </p:ext>
+    </p:extLst>
+  </p:cSld>
+  <p:clrMapOvr>
+    <a:masterClrMapping/>
+  </p:clrMapOvr>
+</p:sld>
+</file>
+
+<file path=ppt/slides/slide8.xml><?xml version="1.0" encoding="utf-8"?>
 <p:sld xmlns:a="http://schemas.openxmlformats.org/drawingml/2006/main" xmlns:r="http://schemas.openxmlformats.org/officeDocument/2006/relationships" xmlns:p="http://schemas.openxmlformats.org/presentationml/2006/main">
   <p:cSld>
     <p:spTree>
@@ -5889,207 +6935,6 @@
 </p:sld>
 </file>
 
-<file path=ppt/slides/slide7.xml><?xml version="1.0" encoding="utf-8"?>
-<p:sld xmlns:a="http://schemas.openxmlformats.org/drawingml/2006/main" xmlns:r="http://schemas.openxmlformats.org/officeDocument/2006/relationships" xmlns:p="http://schemas.openxmlformats.org/presentationml/2006/main">
-  <p:cSld>
-    <p:spTree>
-      <p:nvGrpSpPr>
-        <p:cNvPr id="1" name=""/>
-        <p:cNvGrpSpPr/>
-        <p:nvPr/>
-      </p:nvGrpSpPr>
-      <p:grpSpPr>
-        <a:xfrm>
-          <a:off x="0" y="0"/>
-          <a:ext cx="0" cy="0"/>
-          <a:chOff x="0" y="0"/>
-          <a:chExt cx="0" cy="0"/>
-        </a:xfrm>
-      </p:grpSpPr>
-      <p:sp>
-        <p:nvSpPr>
-          <p:cNvPr id="2" name="Title 1"/>
-          <p:cNvSpPr>
-            <a:spLocks noGrp="1"/>
-          </p:cNvSpPr>
-          <p:nvPr>
-            <p:ph type="title"/>
-          </p:nvPr>
-        </p:nvSpPr>
-        <p:spPr/>
-        <p:txBody>
-          <a:bodyPr/>
-          <a:lstStyle/>
-          <a:p>
-            <a:r>
-              <a:rPr lang="en-US" dirty="0" smtClean="0"/>
-              <a:t>JavaScript</a:t>
-            </a:r>
-            <a:endParaRPr lang="en-US" dirty="0"/>
-          </a:p>
-        </p:txBody>
-      </p:sp>
-      <p:sp>
-        <p:nvSpPr>
-          <p:cNvPr id="3" name="Content Placeholder 2"/>
-          <p:cNvSpPr>
-            <a:spLocks noGrp="1"/>
-          </p:cNvSpPr>
-          <p:nvPr>
-            <p:ph idx="1"/>
-          </p:nvPr>
-        </p:nvSpPr>
-        <p:spPr/>
-        <p:txBody>
-          <a:bodyPr/>
-          <a:lstStyle/>
-          <a:p>
-            <a:r>
-              <a:rPr lang="en-US" dirty="0" smtClean="0"/>
-              <a:t>Client side</a:t>
-            </a:r>
-          </a:p>
-          <a:p>
-            <a:r>
-              <a:rPr lang="en-US" dirty="0" smtClean="0"/>
-              <a:t>Server side</a:t>
-            </a:r>
-          </a:p>
-          <a:p>
-            <a:r>
-              <a:rPr lang="en-US" dirty="0" smtClean="0"/>
-              <a:t>Performance</a:t>
-            </a:r>
-          </a:p>
-          <a:p>
-            <a:endParaRPr lang="en-US" dirty="0"/>
-          </a:p>
-          <a:p>
-            <a:r>
-              <a:rPr lang="en-US" dirty="0" smtClean="0"/>
-              <a:t>Is there anything it can’t do? </a:t>
-            </a:r>
-          </a:p>
-          <a:p>
-            <a:pPr lvl="1"/>
-            <a:r>
-              <a:rPr lang="en-US" dirty="0" smtClean="0"/>
-              <a:t>Much like donuts</a:t>
-            </a:r>
-            <a:endParaRPr lang="en-US" dirty="0"/>
-          </a:p>
-        </p:txBody>
-      </p:sp>
-    </p:spTree>
-    <p:extLst>
-      <p:ext uri="{BB962C8B-B14F-4D97-AF65-F5344CB8AC3E}">
-        <p14:creationId xmlns:p14="http://schemas.microsoft.com/office/powerpoint/2010/main" val="3506512314"/>
-      </p:ext>
-    </p:extLst>
-  </p:cSld>
-  <p:clrMapOvr>
-    <a:masterClrMapping/>
-  </p:clrMapOvr>
-</p:sld>
-</file>
-
-<file path=ppt/slides/slide8.xml><?xml version="1.0" encoding="utf-8"?>
-<p:sld xmlns:a="http://schemas.openxmlformats.org/drawingml/2006/main" xmlns:r="http://schemas.openxmlformats.org/officeDocument/2006/relationships" xmlns:p="http://schemas.openxmlformats.org/presentationml/2006/main">
-  <p:cSld>
-    <p:spTree>
-      <p:nvGrpSpPr>
-        <p:cNvPr id="1" name=""/>
-        <p:cNvGrpSpPr/>
-        <p:nvPr/>
-      </p:nvGrpSpPr>
-      <p:grpSpPr>
-        <a:xfrm>
-          <a:off x="0" y="0"/>
-          <a:ext cx="0" cy="0"/>
-          <a:chOff x="0" y="0"/>
-          <a:chExt cx="0" cy="0"/>
-        </a:xfrm>
-      </p:grpSpPr>
-      <p:sp>
-        <p:nvSpPr>
-          <p:cNvPr id="2" name="Title 1"/>
-          <p:cNvSpPr>
-            <a:spLocks noGrp="1"/>
-          </p:cNvSpPr>
-          <p:nvPr>
-            <p:ph type="title"/>
-          </p:nvPr>
-        </p:nvSpPr>
-        <p:spPr/>
-        <p:txBody>
-          <a:bodyPr/>
-          <a:lstStyle/>
-          <a:p>
-            <a:r>
-              <a:rPr lang="en-US" dirty="0" smtClean="0"/>
-              <a:t>Wait a second</a:t>
-            </a:r>
-            <a:endParaRPr lang="en-US" dirty="0"/>
-          </a:p>
-        </p:txBody>
-      </p:sp>
-      <p:sp>
-        <p:nvSpPr>
-          <p:cNvPr id="3" name="Content Placeholder 2"/>
-          <p:cNvSpPr>
-            <a:spLocks noGrp="1"/>
-          </p:cNvSpPr>
-          <p:nvPr>
-            <p:ph idx="1"/>
-          </p:nvPr>
-        </p:nvSpPr>
-        <p:spPr/>
-        <p:txBody>
-          <a:bodyPr/>
-          <a:lstStyle/>
-          <a:p>
-            <a:r>
-              <a:rPr lang="en-US" dirty="0" smtClean="0"/>
-              <a:t>We spend more time doing client side work than anything</a:t>
-            </a:r>
-          </a:p>
-          <a:p>
-            <a:r>
-              <a:rPr lang="en-US" dirty="0" smtClean="0"/>
-              <a:t>We can pound thru a backend super fast and on a schedule</a:t>
-            </a:r>
-          </a:p>
-          <a:p>
-            <a:r>
-              <a:rPr lang="en-US" dirty="0" smtClean="0"/>
-              <a:t>Client side programming still kicks our butts</a:t>
-            </a:r>
-          </a:p>
-          <a:p>
-            <a:endParaRPr lang="en-US" dirty="0"/>
-          </a:p>
-          <a:p>
-            <a:r>
-              <a:rPr lang="en-US" dirty="0" smtClean="0"/>
-              <a:t>JavaScript is a major part of client side</a:t>
-            </a:r>
-            <a:endParaRPr lang="en-US" dirty="0"/>
-          </a:p>
-        </p:txBody>
-      </p:sp>
-    </p:spTree>
-    <p:extLst>
-      <p:ext uri="{BB962C8B-B14F-4D97-AF65-F5344CB8AC3E}">
-        <p14:creationId xmlns:p14="http://schemas.microsoft.com/office/powerpoint/2010/main" val="4264853513"/>
-      </p:ext>
-    </p:extLst>
-  </p:cSld>
-  <p:clrMapOvr>
-    <a:masterClrMapping/>
-  </p:clrMapOvr>
-</p:sld>
-</file>
-
 <file path=ppt/slides/slide9.xml><?xml version="1.0" encoding="utf-8"?>
 <p:sld xmlns:a="http://schemas.openxmlformats.org/drawingml/2006/main" xmlns:r="http://schemas.openxmlformats.org/officeDocument/2006/relationships" xmlns:p="http://schemas.openxmlformats.org/presentationml/2006/main">
   <p:cSld>
@@ -6124,7 +6969,7 @@
           <a:p>
             <a:r>
               <a:rPr lang="en-US" dirty="0" smtClean="0"/>
-              <a:t>JavaScript is a little weird</a:t>
+              <a:t>JavaScript</a:t>
             </a:r>
             <a:endParaRPr lang="en-US" dirty="0"/>
           </a:p>
@@ -6147,16 +6992,36 @@
           <a:p>
             <a:r>
               <a:rPr lang="en-US" dirty="0" smtClean="0"/>
-              <a:t>Weird isn’t always bad</a:t>
-            </a:r>
-          </a:p>
-          <a:p>
-            <a:r>
-              <a:rPr lang="en-US" dirty="0" smtClean="0"/>
-              <a:t>First class functions in JavaScript are awesome</a:t>
-            </a:r>
-          </a:p>
-          <a:p>
+              <a:t>Client side</a:t>
+            </a:r>
+          </a:p>
+          <a:p>
+            <a:r>
+              <a:rPr lang="en-US" dirty="0" smtClean="0"/>
+              <a:t>Server side</a:t>
+            </a:r>
+          </a:p>
+          <a:p>
+            <a:r>
+              <a:rPr lang="en-US" dirty="0" smtClean="0"/>
+              <a:t>Performance</a:t>
+            </a:r>
+          </a:p>
+          <a:p>
+            <a:endParaRPr lang="en-US" dirty="0"/>
+          </a:p>
+          <a:p>
+            <a:r>
+              <a:rPr lang="en-US" dirty="0" smtClean="0"/>
+              <a:t>Is there anything it can’t do? </a:t>
+            </a:r>
+          </a:p>
+          <a:p>
+            <a:pPr lvl="1"/>
+            <a:r>
+              <a:rPr lang="en-US" dirty="0" smtClean="0"/>
+              <a:t>Much like donuts</a:t>
+            </a:r>
             <a:endParaRPr lang="en-US" dirty="0"/>
           </a:p>
         </p:txBody>
@@ -6164,7 +7029,7 @@
     </p:spTree>
     <p:extLst>
       <p:ext uri="{BB962C8B-B14F-4D97-AF65-F5344CB8AC3E}">
-        <p14:creationId xmlns:p14="http://schemas.microsoft.com/office/powerpoint/2010/main" val="2662107329"/>
+        <p14:creationId xmlns:p14="http://schemas.microsoft.com/office/powerpoint/2010/main" val="3506512314"/>
       </p:ext>
     </p:extLst>
   </p:cSld>
@@ -6429,7 +7294,7 @@
   <a:extraClrSchemeLst/>
   <a:extLst>
     <a:ext uri="{05A4C25C-085E-4340-85A3-A5531E510DB2}">
-      <thm15:themeFamily xmlns="" xmlns:thm15="http://schemas.microsoft.com/office/thememl/2012/main" name="Office Theme" id="{62F939B6-93AF-4DB8-9C6B-D6C7DFDC589F}" vid="{4A3C46E8-61CC-4603-A589-7422A47A8E4A}"/>
+      <thm15:themeFamily xmlns:thm15="http://schemas.microsoft.com/office/thememl/2012/main" xmlns="" name="Office Theme" id="{62F939B6-93AF-4DB8-9C6B-D6C7DFDC589F}" vid="{4A3C46E8-61CC-4603-A589-7422A47A8E4A}"/>
     </a:ext>
   </a:extLst>
 </a:theme>

</xml_diff>